<commit_message>
Added Lecture 3 with classwork
</commit_message>
<xml_diff>
--- a/Lecture 3/Lecture 4- Refactoring and Code Smells-Part 1 (1).pptx
+++ b/Lecture 3/Lecture 4- Refactoring and Code Smells-Part 1 (1).pptx
@@ -5,7 +5,7 @@
     <p:sldMasterId id="2147483659" r:id="rId1"/>
   </p:sldMasterIdLst>
   <p:notesMasterIdLst>
-    <p:notesMasterId r:id="rId49"/>
+    <p:notesMasterId r:id="rId51"/>
   </p:notesMasterIdLst>
   <p:sldIdLst>
     <p:sldId id="256" r:id="rId2"/>
@@ -32,53 +32,55 @@
     <p:sldId id="278" r:id="rId23"/>
     <p:sldId id="279" r:id="rId24"/>
     <p:sldId id="280" r:id="rId25"/>
-    <p:sldId id="281" r:id="rId26"/>
-    <p:sldId id="282" r:id="rId27"/>
-    <p:sldId id="283" r:id="rId28"/>
-    <p:sldId id="284" r:id="rId29"/>
-    <p:sldId id="285" r:id="rId30"/>
-    <p:sldId id="286" r:id="rId31"/>
-    <p:sldId id="287" r:id="rId32"/>
-    <p:sldId id="288" r:id="rId33"/>
-    <p:sldId id="289" r:id="rId34"/>
-    <p:sldId id="290" r:id="rId35"/>
-    <p:sldId id="291" r:id="rId36"/>
-    <p:sldId id="292" r:id="rId37"/>
-    <p:sldId id="293" r:id="rId38"/>
-    <p:sldId id="294" r:id="rId39"/>
-    <p:sldId id="295" r:id="rId40"/>
-    <p:sldId id="296" r:id="rId41"/>
-    <p:sldId id="297" r:id="rId42"/>
-    <p:sldId id="298" r:id="rId43"/>
-    <p:sldId id="299" r:id="rId44"/>
-    <p:sldId id="300" r:id="rId45"/>
-    <p:sldId id="301" r:id="rId46"/>
-    <p:sldId id="312" r:id="rId47"/>
-    <p:sldId id="313" r:id="rId48"/>
+    <p:sldId id="315" r:id="rId26"/>
+    <p:sldId id="281" r:id="rId27"/>
+    <p:sldId id="282" r:id="rId28"/>
+    <p:sldId id="283" r:id="rId29"/>
+    <p:sldId id="284" r:id="rId30"/>
+    <p:sldId id="285" r:id="rId31"/>
+    <p:sldId id="286" r:id="rId32"/>
+    <p:sldId id="287" r:id="rId33"/>
+    <p:sldId id="314" r:id="rId34"/>
+    <p:sldId id="288" r:id="rId35"/>
+    <p:sldId id="289" r:id="rId36"/>
+    <p:sldId id="290" r:id="rId37"/>
+    <p:sldId id="291" r:id="rId38"/>
+    <p:sldId id="292" r:id="rId39"/>
+    <p:sldId id="293" r:id="rId40"/>
+    <p:sldId id="294" r:id="rId41"/>
+    <p:sldId id="295" r:id="rId42"/>
+    <p:sldId id="296" r:id="rId43"/>
+    <p:sldId id="297" r:id="rId44"/>
+    <p:sldId id="298" r:id="rId45"/>
+    <p:sldId id="299" r:id="rId46"/>
+    <p:sldId id="300" r:id="rId47"/>
+    <p:sldId id="301" r:id="rId48"/>
+    <p:sldId id="312" r:id="rId49"/>
+    <p:sldId id="313" r:id="rId50"/>
   </p:sldIdLst>
   <p:sldSz cx="9144000" cy="5143500" type="screen16x9"/>
   <p:notesSz cx="6858000" cy="9144000"/>
   <p:embeddedFontLst>
     <p:embeddedFont>
       <p:font typeface="Raleway" pitchFamily="2" charset="0"/>
-      <p:regular r:id="rId50"/>
-      <p:bold r:id="rId51"/>
-      <p:italic r:id="rId52"/>
-      <p:boldItalic r:id="rId53"/>
+      <p:regular r:id="rId52"/>
+      <p:bold r:id="rId53"/>
+      <p:italic r:id="rId54"/>
+      <p:boldItalic r:id="rId55"/>
     </p:embeddedFont>
     <p:embeddedFont>
       <p:font typeface="Roboto" panose="02000000000000000000" pitchFamily="2" charset="0"/>
-      <p:regular r:id="rId54"/>
-      <p:bold r:id="rId55"/>
-      <p:italic r:id="rId56"/>
-      <p:boldItalic r:id="rId57"/>
+      <p:regular r:id="rId56"/>
+      <p:bold r:id="rId57"/>
+      <p:italic r:id="rId58"/>
+      <p:boldItalic r:id="rId59"/>
     </p:embeddedFont>
     <p:embeddedFont>
       <p:font typeface="Source Sans Pro" panose="020B0503030403020204" pitchFamily="34" charset="0"/>
-      <p:regular r:id="rId58"/>
-      <p:bold r:id="rId59"/>
-      <p:italic r:id="rId60"/>
-      <p:boldItalic r:id="rId61"/>
+      <p:regular r:id="rId60"/>
+      <p:bold r:id="rId61"/>
+      <p:italic r:id="rId62"/>
+      <p:boldItalic r:id="rId63"/>
     </p:embeddedFont>
   </p:embeddedFontLst>
   <p:defaultTextStyle>
@@ -11757,7 +11759,7 @@
               <a:buChar char="➢"/>
             </a:pPr>
             <a:r>
-              <a:rPr lang="en" sz="2000">
+              <a:rPr lang="en" sz="2000" dirty="0">
                 <a:solidFill>
                   <a:srgbClr val="444444"/>
                 </a:solidFill>
@@ -11771,7 +11773,7 @@
               </a:rPr>
               <a:t>The code should become cleaner.</a:t>
             </a:r>
-            <a:endParaRPr sz="2000">
+            <a:endParaRPr sz="2000" dirty="0">
               <a:solidFill>
                 <a:srgbClr val="444444"/>
               </a:solidFill>
@@ -11803,7 +11805,7 @@
               <a:buChar char="➢"/>
             </a:pPr>
             <a:r>
-              <a:rPr lang="en" sz="2000">
+              <a:rPr lang="en" sz="2000" dirty="0">
                 <a:solidFill>
                   <a:srgbClr val="444444"/>
                 </a:solidFill>
@@ -11817,7 +11819,7 @@
               </a:rPr>
               <a:t> New functionality shouldn’t be created during refactoring.</a:t>
             </a:r>
-            <a:endParaRPr sz="2000">
+            <a:endParaRPr sz="2000" dirty="0">
               <a:solidFill>
                 <a:srgbClr val="444444"/>
               </a:solidFill>
@@ -11849,7 +11851,7 @@
               <a:buChar char="➢"/>
             </a:pPr>
             <a:r>
-              <a:rPr lang="en" sz="2000">
+              <a:rPr lang="en" sz="2000" dirty="0">
                 <a:solidFill>
                   <a:srgbClr val="444444"/>
                 </a:solidFill>
@@ -11863,7 +11865,7 @@
               </a:rPr>
               <a:t> All existing tests must pass after refactoring.</a:t>
             </a:r>
-            <a:endParaRPr sz="2000">
+            <a:endParaRPr sz="2000" dirty="0">
               <a:solidFill>
                 <a:srgbClr val="444444"/>
               </a:solidFill>
@@ -11894,7 +11896,7 @@
               <a:buChar char="➢"/>
             </a:pPr>
             <a:r>
-              <a:rPr lang="en" sz="2000">
+              <a:rPr lang="en" sz="2000" dirty="0">
                 <a:solidFill>
                   <a:srgbClr val="444444"/>
                 </a:solidFill>
@@ -11904,7 +11906,7 @@
               </a:rPr>
               <a:t>There are two cases when tests can break down after refactoring:</a:t>
             </a:r>
-            <a:endParaRPr sz="2000">
+            <a:endParaRPr sz="2000" dirty="0">
               <a:solidFill>
                 <a:srgbClr val="444444"/>
               </a:solidFill>
@@ -11931,7 +11933,7 @@
               <a:buChar char="○"/>
             </a:pPr>
             <a:r>
-              <a:rPr lang="en" sz="1600">
+              <a:rPr lang="en" sz="1600" dirty="0">
                 <a:solidFill>
                   <a:srgbClr val="444444"/>
                 </a:solidFill>
@@ -11941,7 +11943,25 @@
               </a:rPr>
               <a:t>You made an error during refactoring. This one is a no-brainer: go ahead and fix the error.</a:t>
             </a:r>
-            <a:endParaRPr sz="1600">
+          </a:p>
+          <a:p>
+            <a:pPr marL="914400" lvl="1" indent="-330200" algn="just" rtl="0">
+              <a:lnSpc>
+                <a:spcPct val="100000"/>
+              </a:lnSpc>
+              <a:spcBef>
+                <a:spcPts val="0"/>
+              </a:spcBef>
+              <a:spcAft>
+                <a:spcPts val="0"/>
+              </a:spcAft>
+              <a:buClr>
+                <a:srgbClr val="444444"/>
+              </a:buClr>
+              <a:buSzPts val="1600"/>
+              <a:buChar char="○"/>
+            </a:pPr>
+            <a:endParaRPr sz="1600" dirty="0">
               <a:solidFill>
                 <a:srgbClr val="444444"/>
               </a:solidFill>
@@ -11968,7 +11988,7 @@
               <a:buChar char="○"/>
             </a:pPr>
             <a:r>
-              <a:rPr lang="en" sz="1600">
+              <a:rPr lang="en" sz="1600" dirty="0">
                 <a:solidFill>
                   <a:srgbClr val="444444"/>
                 </a:solidFill>
@@ -11979,7 +11999,7 @@
               <a:t>Your tests were too low-level. For example, you were testing private methods of classes.</a:t>
             </a:r>
             <a:br>
-              <a:rPr lang="en" sz="1600">
+              <a:rPr lang="en" sz="1600" dirty="0">
                 <a:solidFill>
                   <a:srgbClr val="444444"/>
                 </a:solidFill>
@@ -11989,7 +12009,7 @@
               </a:rPr>
             </a:br>
             <a:r>
-              <a:rPr lang="en" sz="1600">
+              <a:rPr lang="en" sz="1600" dirty="0">
                 <a:solidFill>
                   <a:srgbClr val="444444"/>
                 </a:solidFill>
@@ -12000,7 +12020,7 @@
               <a:t>In this case, the tests are to blame. You can either refactor the tests themselves or write an entirely new set of higher-level tests. A great way to avoid this kind of a situation is to write </a:t>
             </a:r>
             <a:r>
-              <a:rPr lang="en" sz="1600">
+              <a:rPr lang="en" sz="1600" dirty="0">
                 <a:solidFill>
                   <a:srgbClr val="444444"/>
                 </a:solidFill>
@@ -12021,7 +12041,7 @@
               <a:t>BDD-style</a:t>
             </a:r>
             <a:r>
-              <a:rPr lang="en" sz="1600">
+              <a:rPr lang="en" sz="1600" dirty="0">
                 <a:solidFill>
                   <a:srgbClr val="444444"/>
                 </a:solidFill>
@@ -12031,7 +12051,7 @@
               </a:rPr>
               <a:t> tests.</a:t>
             </a:r>
-            <a:endParaRPr sz="1600">
+            <a:endParaRPr sz="1600" dirty="0">
               <a:solidFill>
                 <a:srgbClr val="444444"/>
               </a:solidFill>
@@ -12053,7 +12073,7 @@
               </a:spcAft>
               <a:buNone/>
             </a:pPr>
-            <a:endParaRPr sz="2000"/>
+            <a:endParaRPr sz="2000" dirty="0"/>
           </a:p>
           <a:p>
             <a:pPr marL="0" lvl="0" indent="0" algn="just" rtl="0">
@@ -12068,7 +12088,7 @@
               </a:spcAft>
               <a:buNone/>
             </a:pPr>
-            <a:endParaRPr sz="2000">
+            <a:endParaRPr sz="2000" dirty="0">
               <a:solidFill>
                 <a:srgbClr val="444444"/>
               </a:solidFill>
@@ -13384,7 +13404,7 @@
               <a:buNone/>
             </a:pPr>
             <a:r>
-              <a:rPr lang="en" sz="2200">
+              <a:rPr lang="en" sz="2200" dirty="0">
                 <a:solidFill>
                   <a:srgbClr val="444444"/>
                 </a:solidFill>
@@ -13394,7 +13414,7 @@
               </a:rPr>
               <a:t>A method is filled with explanatory comments.</a:t>
             </a:r>
-            <a:endParaRPr sz="2200">
+            <a:endParaRPr sz="2200" dirty="0">
               <a:solidFill>
                 <a:srgbClr val="444444"/>
               </a:solidFill>
@@ -13417,7 +13437,7 @@
               <a:buNone/>
             </a:pPr>
             <a:r>
-              <a:rPr lang="en" sz="2200" b="1">
+              <a:rPr lang="en" sz="2200" b="1" dirty="0">
                 <a:solidFill>
                   <a:srgbClr val="444444"/>
                 </a:solidFill>
@@ -13427,7 +13447,7 @@
               </a:rPr>
               <a:t>Reasons for the Problem</a:t>
             </a:r>
-            <a:endParaRPr sz="2200" b="1">
+            <a:endParaRPr sz="2200" b="1" dirty="0">
               <a:solidFill>
                 <a:srgbClr val="444444"/>
               </a:solidFill>
@@ -13450,7 +13470,7 @@
               <a:buNone/>
             </a:pPr>
             <a:r>
-              <a:rPr lang="en" sz="2200">
+              <a:rPr lang="en" sz="2200" dirty="0">
                 <a:solidFill>
                   <a:srgbClr val="444444"/>
                 </a:solidFill>
@@ -13460,7 +13480,7 @@
               </a:rPr>
               <a:t>Comments are usually created with the best of intentions, when the author realizes that his or her code isn’t intuitive or obvious. In such cases, comments are like a deodorant masking the smell of fishy code that could be improved.</a:t>
             </a:r>
-            <a:endParaRPr sz="2200">
+            <a:endParaRPr sz="2200" dirty="0">
               <a:solidFill>
                 <a:srgbClr val="444444"/>
               </a:solidFill>
@@ -13483,7 +13503,7 @@
               <a:buNone/>
             </a:pPr>
             <a:r>
-              <a:rPr lang="en" sz="2200" b="1">
+              <a:rPr lang="en" sz="2200" b="1" dirty="0">
                 <a:solidFill>
                   <a:srgbClr val="444444"/>
                 </a:solidFill>
@@ -13493,7 +13513,7 @@
               </a:rPr>
               <a:t>The best comment is a good name for a method or class.</a:t>
             </a:r>
-            <a:endParaRPr sz="2200" b="1">
+            <a:endParaRPr sz="2200" b="1" dirty="0">
               <a:solidFill>
                 <a:srgbClr val="444444"/>
               </a:solidFill>
@@ -13515,7 +13535,7 @@
               </a:spcAft>
               <a:buNone/>
             </a:pPr>
-            <a:endParaRPr sz="2200">
+            <a:endParaRPr sz="2200" dirty="0">
               <a:solidFill>
                 <a:srgbClr val="444444"/>
               </a:solidFill>
@@ -13537,7 +13557,7 @@
               </a:spcAft>
               <a:buNone/>
             </a:pPr>
-            <a:endParaRPr sz="2200">
+            <a:endParaRPr sz="2200" dirty="0">
               <a:solidFill>
                 <a:srgbClr val="444444"/>
               </a:solidFill>
@@ -14004,10 +14024,10 @@
               <a:buNone/>
             </a:pPr>
             <a:r>
-              <a:rPr lang="en"/>
+              <a:rPr lang="en" dirty="0"/>
               <a:t>Remedies- Extract Variable</a:t>
             </a:r>
-            <a:endParaRPr/>
+            <a:endParaRPr dirty="0"/>
           </a:p>
         </p:txBody>
       </p:sp>
@@ -14150,7 +14170,7 @@
                         <a:buNone/>
                       </a:pPr>
                       <a:r>
-                        <a:rPr lang="en" sz="1600">
+                        <a:rPr lang="en" sz="1600" dirty="0">
                           <a:solidFill>
                             <a:schemeClr val="dk2"/>
                           </a:solidFill>
@@ -14161,7 +14181,7 @@
                         </a:rPr>
                         <a:t>public class SimpleCalculator {</a:t>
                       </a:r>
-                      <a:endParaRPr sz="1600">
+                      <a:endParaRPr sz="1600" dirty="0">
                         <a:solidFill>
                           <a:schemeClr val="dk2"/>
                         </a:solidFill>
@@ -14187,7 +14207,7 @@
                         <a:buNone/>
                       </a:pPr>
                       <a:r>
-                        <a:rPr lang="en" sz="1600">
+                        <a:rPr lang="en" sz="1600" dirty="0">
                           <a:solidFill>
                             <a:schemeClr val="dk2"/>
                           </a:solidFill>
@@ -14198,7 +14218,7 @@
                         </a:rPr>
                         <a:t>    public int calculateTotal(int a, int b) {</a:t>
                       </a:r>
-                      <a:endParaRPr sz="1600">
+                      <a:endParaRPr sz="1600" dirty="0">
                         <a:solidFill>
                           <a:schemeClr val="dk2"/>
                         </a:solidFill>
@@ -14224,7 +14244,7 @@
                         <a:buNone/>
                       </a:pPr>
                       <a:r>
-                        <a:rPr lang="en" sz="1600">
+                        <a:rPr lang="en" sz="1600" dirty="0">
                           <a:solidFill>
                             <a:schemeClr val="dk2"/>
                           </a:solidFill>
@@ -14235,7 +14255,7 @@
                         </a:rPr>
                         <a:t>        return a * b - (a + b);</a:t>
                       </a:r>
-                      <a:endParaRPr sz="1600">
+                      <a:endParaRPr sz="1600" dirty="0">
                         <a:solidFill>
                           <a:schemeClr val="dk2"/>
                         </a:solidFill>
@@ -14261,7 +14281,7 @@
                         <a:buNone/>
                       </a:pPr>
                       <a:r>
-                        <a:rPr lang="en" sz="1600">
+                        <a:rPr lang="en" sz="1600" dirty="0">
                           <a:solidFill>
                             <a:schemeClr val="dk2"/>
                           </a:solidFill>
@@ -14272,7 +14292,7 @@
                         </a:rPr>
                         <a:t>    }</a:t>
                       </a:r>
-                      <a:endParaRPr sz="1600">
+                      <a:endParaRPr sz="1600" dirty="0">
                         <a:solidFill>
                           <a:schemeClr val="dk2"/>
                         </a:solidFill>
@@ -14298,7 +14318,7 @@
                         <a:buNone/>
                       </a:pPr>
                       <a:r>
-                        <a:rPr lang="en" sz="1600">
+                        <a:rPr lang="en" sz="1600" dirty="0">
                           <a:solidFill>
                             <a:schemeClr val="dk2"/>
                           </a:solidFill>
@@ -14309,7 +14329,7 @@
                         </a:rPr>
                         <a:t>}</a:t>
                       </a:r>
-                      <a:endParaRPr sz="1600">
+                      <a:endParaRPr sz="1600" dirty="0">
                         <a:solidFill>
                           <a:schemeClr val="dk2"/>
                         </a:solidFill>
@@ -14334,7 +14354,7 @@
                         <a:buFont typeface="Arial"/>
                         <a:buNone/>
                       </a:pPr>
-                      <a:endParaRPr sz="1600">
+                      <a:endParaRPr sz="1600" dirty="0">
                         <a:solidFill>
                           <a:schemeClr val="dk2"/>
                         </a:solidFill>
@@ -14354,7 +14374,7 @@
                         </a:spcAft>
                         <a:buNone/>
                       </a:pPr>
-                      <a:endParaRPr sz="1600">
+                      <a:endParaRPr sz="1600" dirty="0">
                         <a:solidFill>
                           <a:schemeClr val="dk2"/>
                         </a:solidFill>
@@ -14387,7 +14407,7 @@
                         <a:buNone/>
                       </a:pPr>
                       <a:r>
-                        <a:rPr lang="en" sz="1600">
+                        <a:rPr lang="en" sz="1600" dirty="0">
                           <a:solidFill>
                             <a:schemeClr val="dk2"/>
                           </a:solidFill>
@@ -14398,7 +14418,7 @@
                         </a:rPr>
                         <a:t>public class SimpleCalculator {</a:t>
                       </a:r>
-                      <a:endParaRPr sz="1600">
+                      <a:endParaRPr sz="1600" dirty="0">
                         <a:solidFill>
                           <a:schemeClr val="dk2"/>
                         </a:solidFill>
@@ -14424,7 +14444,7 @@
                         <a:buNone/>
                       </a:pPr>
                       <a:r>
-                        <a:rPr lang="en" sz="1600">
+                        <a:rPr lang="en" sz="1600" dirty="0">
                           <a:solidFill>
                             <a:schemeClr val="dk2"/>
                           </a:solidFill>
@@ -14435,7 +14455,7 @@
                         </a:rPr>
                         <a:t>    public int calculateTotal(int a, int b) {</a:t>
                       </a:r>
-                      <a:endParaRPr sz="1600">
+                      <a:endParaRPr sz="1600" dirty="0">
                         <a:solidFill>
                           <a:schemeClr val="dk2"/>
                         </a:solidFill>
@@ -14460,7 +14480,7 @@
                         <a:buFont typeface="Arial"/>
                         <a:buNone/>
                       </a:pPr>
-                      <a:endParaRPr sz="1600">
+                      <a:endParaRPr sz="1600" dirty="0">
                         <a:solidFill>
                           <a:schemeClr val="dk2"/>
                         </a:solidFill>
@@ -14486,7 +14506,7 @@
                         <a:buNone/>
                       </a:pPr>
                       <a:r>
-                        <a:rPr lang="en" sz="1600">
+                        <a:rPr lang="en" sz="1600" dirty="0">
                           <a:solidFill>
                             <a:schemeClr val="dk2"/>
                           </a:solidFill>
@@ -14497,7 +14517,7 @@
                         </a:rPr>
                         <a:t>        int product = a * b;</a:t>
                       </a:r>
-                      <a:endParaRPr sz="1600">
+                      <a:endParaRPr sz="1600" dirty="0">
                         <a:solidFill>
                           <a:schemeClr val="dk2"/>
                         </a:solidFill>
@@ -14523,7 +14543,7 @@
                         <a:buNone/>
                       </a:pPr>
                       <a:r>
-                        <a:rPr lang="en" sz="1600">
+                        <a:rPr lang="en" sz="1600" dirty="0">
                           <a:solidFill>
                             <a:schemeClr val="dk2"/>
                           </a:solidFill>
@@ -14534,7 +14554,7 @@
                         </a:rPr>
                         <a:t>        int sum = a + b;</a:t>
                       </a:r>
-                      <a:endParaRPr sz="1600">
+                      <a:endParaRPr sz="1600" dirty="0">
                         <a:solidFill>
                           <a:schemeClr val="dk2"/>
                         </a:solidFill>
@@ -14559,7 +14579,7 @@
                         <a:buFont typeface="Arial"/>
                         <a:buNone/>
                       </a:pPr>
-                      <a:endParaRPr sz="1600">
+                      <a:endParaRPr sz="1600" dirty="0">
                         <a:solidFill>
                           <a:schemeClr val="dk2"/>
                         </a:solidFill>
@@ -14585,7 +14605,7 @@
                         <a:buNone/>
                       </a:pPr>
                       <a:r>
-                        <a:rPr lang="en" sz="1600">
+                        <a:rPr lang="en" sz="1600" dirty="0">
                           <a:solidFill>
                             <a:schemeClr val="dk2"/>
                           </a:solidFill>
@@ -14596,7 +14616,7 @@
                         </a:rPr>
                         <a:t>        return product - sum;</a:t>
                       </a:r>
-                      <a:endParaRPr sz="1600">
+                      <a:endParaRPr sz="1600" dirty="0">
                         <a:solidFill>
                           <a:schemeClr val="dk2"/>
                         </a:solidFill>
@@ -14622,7 +14642,7 @@
                         <a:buNone/>
                       </a:pPr>
                       <a:r>
-                        <a:rPr lang="en" sz="1600">
+                        <a:rPr lang="en" sz="1600" dirty="0">
                           <a:solidFill>
                             <a:schemeClr val="dk2"/>
                           </a:solidFill>
@@ -14633,7 +14653,7 @@
                         </a:rPr>
                         <a:t>    }</a:t>
                       </a:r>
-                      <a:endParaRPr sz="1600">
+                      <a:endParaRPr sz="1600" dirty="0">
                         <a:solidFill>
                           <a:schemeClr val="dk2"/>
                         </a:solidFill>
@@ -14654,7 +14674,7 @@
                         <a:buNone/>
                       </a:pPr>
                       <a:r>
-                        <a:rPr lang="en" sz="1600">
+                        <a:rPr lang="en" sz="1600" dirty="0">
                           <a:solidFill>
                             <a:schemeClr val="dk2"/>
                           </a:solidFill>
@@ -14665,7 +14685,7 @@
                         </a:rPr>
                         <a:t>}</a:t>
                       </a:r>
-                      <a:endParaRPr sz="1600">
+                      <a:endParaRPr sz="1600" dirty="0">
                         <a:solidFill>
                           <a:schemeClr val="dk2"/>
                         </a:solidFill>
@@ -17208,6 +17228,1456 @@
   <p:cSld>
     <p:spTree>
       <p:nvGrpSpPr>
+        <p:cNvPr id="1" name=""/>
+        <p:cNvGrpSpPr/>
+        <p:nvPr/>
+      </p:nvGrpSpPr>
+      <p:grpSpPr>
+        <a:xfrm>
+          <a:off x="0" y="0"/>
+          <a:ext cx="0" cy="0"/>
+          <a:chOff x="0" y="0"/>
+          <a:chExt cx="0" cy="0"/>
+        </a:xfrm>
+      </p:grpSpPr>
+      <p:sp>
+        <p:nvSpPr>
+          <p:cNvPr id="2" name="Title 1">
+            <a:extLst>
+              <a:ext uri="{FF2B5EF4-FFF2-40B4-BE49-F238E27FC236}">
+                <a16:creationId xmlns:a16="http://schemas.microsoft.com/office/drawing/2014/main" id="{04443C41-CF81-4D7D-9AAF-9F36AE536964}"/>
+              </a:ext>
+            </a:extLst>
+          </p:cNvPr>
+          <p:cNvSpPr>
+            <a:spLocks noGrp="1"/>
+          </p:cNvSpPr>
+          <p:nvPr>
+            <p:ph type="title"/>
+          </p:nvPr>
+        </p:nvSpPr>
+        <p:spPr/>
+        <p:txBody>
+          <a:bodyPr/>
+          <a:lstStyle/>
+          <a:p>
+            <a:r>
+              <a:rPr lang="en-US" dirty="0"/>
+              <a:t>Classwork 1</a:t>
+            </a:r>
+          </a:p>
+        </p:txBody>
+      </p:sp>
+      <p:sp>
+        <p:nvSpPr>
+          <p:cNvPr id="4" name="Text Placeholder 3">
+            <a:extLst>
+              <a:ext uri="{FF2B5EF4-FFF2-40B4-BE49-F238E27FC236}">
+                <a16:creationId xmlns:a16="http://schemas.microsoft.com/office/drawing/2014/main" id="{59C93C07-E1C1-4C8B-AD90-29FDED9B725C}"/>
+              </a:ext>
+            </a:extLst>
+          </p:cNvPr>
+          <p:cNvSpPr txBox="1">
+            <a:spLocks noGrp="1"/>
+          </p:cNvSpPr>
+          <p:nvPr>
+            <p:ph type="body" idx="1"/>
+          </p:nvPr>
+        </p:nvSpPr>
+        <p:spPr>
+          <a:xfrm>
+            <a:off x="0" y="1458354"/>
+            <a:ext cx="4444678" cy="4007221"/>
+          </a:xfrm>
+          <a:prstGeom prst="rect">
+            <a:avLst/>
+          </a:prstGeom>
+          <a:noFill/>
+        </p:spPr>
+        <p:txBody>
+          <a:bodyPr wrap="square">
+            <a:spAutoFit/>
+          </a:bodyPr>
+          <a:lstStyle/>
+          <a:p>
+            <a:r>
+              <a:rPr lang="en-US" dirty="0">
+                <a:solidFill>
+                  <a:srgbClr val="080808"/>
+                </a:solidFill>
+                <a:effectLst/>
+                <a:latin typeface="JetBrains Mono"/>
+              </a:rPr>
+              <a:t>    </a:t>
+            </a:r>
+            <a:r>
+              <a:rPr lang="en-US" dirty="0">
+                <a:solidFill>
+                  <a:srgbClr val="0033B3"/>
+                </a:solidFill>
+                <a:effectLst/>
+                <a:latin typeface="JetBrains Mono"/>
+              </a:rPr>
+              <a:t>public static </a:t>
+            </a:r>
+            <a:r>
+              <a:rPr lang="en-US" dirty="0" err="1">
+                <a:solidFill>
+                  <a:srgbClr val="0033B3"/>
+                </a:solidFill>
+                <a:effectLst/>
+                <a:latin typeface="JetBrains Mono"/>
+              </a:rPr>
+              <a:t>boolean</a:t>
+            </a:r>
+            <a:r>
+              <a:rPr lang="en-US" dirty="0">
+                <a:solidFill>
+                  <a:srgbClr val="0033B3"/>
+                </a:solidFill>
+                <a:effectLst/>
+                <a:latin typeface="JetBrains Mono"/>
+              </a:rPr>
+              <a:t> </a:t>
+            </a:r>
+            <a:r>
+              <a:rPr lang="en-US" dirty="0">
+                <a:solidFill>
+                  <a:srgbClr val="00627A"/>
+                </a:solidFill>
+                <a:effectLst/>
+                <a:latin typeface="JetBrains Mono"/>
+              </a:rPr>
+              <a:t>fun1</a:t>
+            </a:r>
+            <a:r>
+              <a:rPr lang="en-US" dirty="0">
+                <a:solidFill>
+                  <a:srgbClr val="080808"/>
+                </a:solidFill>
+                <a:effectLst/>
+                <a:latin typeface="JetBrains Mono"/>
+              </a:rPr>
+              <a:t>(</a:t>
+            </a:r>
+            <a:r>
+              <a:rPr lang="en-US" dirty="0">
+                <a:solidFill>
+                  <a:srgbClr val="0033B3"/>
+                </a:solidFill>
+                <a:effectLst/>
+                <a:latin typeface="JetBrains Mono"/>
+              </a:rPr>
+              <a:t>int </a:t>
+            </a:r>
+            <a:r>
+              <a:rPr lang="en-US" dirty="0">
+                <a:solidFill>
+                  <a:srgbClr val="080808"/>
+                </a:solidFill>
+                <a:effectLst/>
+                <a:latin typeface="JetBrains Mono"/>
+              </a:rPr>
+              <a:t>a, </a:t>
+            </a:r>
+            <a:r>
+              <a:rPr lang="en-US" dirty="0">
+                <a:solidFill>
+                  <a:srgbClr val="0033B3"/>
+                </a:solidFill>
+                <a:effectLst/>
+                <a:latin typeface="JetBrains Mono"/>
+              </a:rPr>
+              <a:t>int </a:t>
+            </a:r>
+            <a:r>
+              <a:rPr lang="en-US" dirty="0">
+                <a:solidFill>
+                  <a:srgbClr val="080808"/>
+                </a:solidFill>
+                <a:effectLst/>
+                <a:latin typeface="JetBrains Mono"/>
+              </a:rPr>
+              <a:t>b)</a:t>
+            </a:r>
+            <a:br>
+              <a:rPr lang="en-US" dirty="0">
+                <a:solidFill>
+                  <a:srgbClr val="080808"/>
+                </a:solidFill>
+                <a:effectLst/>
+                <a:latin typeface="JetBrains Mono"/>
+              </a:rPr>
+            </a:br>
+            <a:r>
+              <a:rPr lang="en-US" dirty="0">
+                <a:solidFill>
+                  <a:srgbClr val="080808"/>
+                </a:solidFill>
+                <a:effectLst/>
+                <a:latin typeface="JetBrains Mono"/>
+              </a:rPr>
+              <a:t>    {</a:t>
+            </a:r>
+            <a:br>
+              <a:rPr lang="en-US" dirty="0">
+                <a:solidFill>
+                  <a:srgbClr val="080808"/>
+                </a:solidFill>
+                <a:effectLst/>
+                <a:latin typeface="JetBrains Mono"/>
+              </a:rPr>
+            </a:br>
+            <a:r>
+              <a:rPr lang="en-US" dirty="0">
+                <a:solidFill>
+                  <a:srgbClr val="080808"/>
+                </a:solidFill>
+                <a:effectLst/>
+                <a:latin typeface="JetBrains Mono"/>
+              </a:rPr>
+              <a:t>        </a:t>
+            </a:r>
+            <a:r>
+              <a:rPr lang="en-US" dirty="0">
+                <a:solidFill>
+                  <a:srgbClr val="0033B3"/>
+                </a:solidFill>
+                <a:effectLst/>
+                <a:latin typeface="JetBrains Mono"/>
+              </a:rPr>
+              <a:t>if</a:t>
+            </a:r>
+            <a:r>
+              <a:rPr lang="en-US" dirty="0">
+                <a:solidFill>
+                  <a:srgbClr val="080808"/>
+                </a:solidFill>
+                <a:effectLst/>
+                <a:latin typeface="JetBrains Mono"/>
+              </a:rPr>
+              <a:t>(a&gt;</a:t>
+            </a:r>
+            <a:r>
+              <a:rPr lang="en-US" dirty="0">
+                <a:solidFill>
+                  <a:srgbClr val="1750EB"/>
+                </a:solidFill>
+                <a:effectLst/>
+                <a:latin typeface="JetBrains Mono"/>
+              </a:rPr>
+              <a:t>2</a:t>
+            </a:r>
+            <a:r>
+              <a:rPr lang="en-US" dirty="0">
+                <a:solidFill>
+                  <a:srgbClr val="080808"/>
+                </a:solidFill>
+                <a:effectLst/>
+                <a:latin typeface="JetBrains Mono"/>
+              </a:rPr>
+              <a:t>)</a:t>
+            </a:r>
+            <a:br>
+              <a:rPr lang="en-US" dirty="0">
+                <a:solidFill>
+                  <a:srgbClr val="080808"/>
+                </a:solidFill>
+                <a:effectLst/>
+                <a:latin typeface="JetBrains Mono"/>
+              </a:rPr>
+            </a:br>
+            <a:r>
+              <a:rPr lang="en-US" dirty="0">
+                <a:solidFill>
+                  <a:srgbClr val="080808"/>
+                </a:solidFill>
+                <a:effectLst/>
+                <a:latin typeface="JetBrains Mono"/>
+              </a:rPr>
+              <a:t>            </a:t>
+            </a:r>
+            <a:r>
+              <a:rPr lang="en-US" dirty="0">
+                <a:solidFill>
+                  <a:srgbClr val="0033B3"/>
+                </a:solidFill>
+                <a:effectLst/>
+                <a:latin typeface="JetBrains Mono"/>
+              </a:rPr>
+              <a:t>return true</a:t>
+            </a:r>
+            <a:r>
+              <a:rPr lang="en-US" dirty="0">
+                <a:solidFill>
+                  <a:srgbClr val="080808"/>
+                </a:solidFill>
+                <a:effectLst/>
+                <a:latin typeface="JetBrains Mono"/>
+              </a:rPr>
+              <a:t>;</a:t>
+            </a:r>
+            <a:br>
+              <a:rPr lang="en-US" dirty="0">
+                <a:solidFill>
+                  <a:srgbClr val="080808"/>
+                </a:solidFill>
+                <a:effectLst/>
+                <a:latin typeface="JetBrains Mono"/>
+              </a:rPr>
+            </a:br>
+            <a:r>
+              <a:rPr lang="en-US" dirty="0">
+                <a:solidFill>
+                  <a:srgbClr val="080808"/>
+                </a:solidFill>
+                <a:effectLst/>
+                <a:latin typeface="JetBrains Mono"/>
+              </a:rPr>
+              <a:t>        </a:t>
+            </a:r>
+            <a:r>
+              <a:rPr lang="en-US" dirty="0">
+                <a:solidFill>
+                  <a:srgbClr val="0033B3"/>
+                </a:solidFill>
+                <a:effectLst/>
+                <a:latin typeface="JetBrains Mono"/>
+              </a:rPr>
+              <a:t>else</a:t>
+            </a:r>
+            <a:br>
+              <a:rPr lang="en-US" dirty="0">
+                <a:solidFill>
+                  <a:srgbClr val="0033B3"/>
+                </a:solidFill>
+                <a:effectLst/>
+                <a:latin typeface="JetBrains Mono"/>
+              </a:rPr>
+            </a:br>
+            <a:r>
+              <a:rPr lang="en-US" dirty="0">
+                <a:solidFill>
+                  <a:srgbClr val="0033B3"/>
+                </a:solidFill>
+                <a:effectLst/>
+                <a:latin typeface="JetBrains Mono"/>
+              </a:rPr>
+              <a:t>            return false</a:t>
+            </a:r>
+            <a:r>
+              <a:rPr lang="en-US" dirty="0">
+                <a:solidFill>
+                  <a:srgbClr val="080808"/>
+                </a:solidFill>
+                <a:effectLst/>
+                <a:latin typeface="JetBrains Mono"/>
+              </a:rPr>
+              <a:t>;</a:t>
+            </a:r>
+            <a:br>
+              <a:rPr lang="en-US" dirty="0">
+                <a:solidFill>
+                  <a:srgbClr val="080808"/>
+                </a:solidFill>
+                <a:effectLst/>
+                <a:latin typeface="JetBrains Mono"/>
+              </a:rPr>
+            </a:br>
+            <a:r>
+              <a:rPr lang="en-US" dirty="0">
+                <a:solidFill>
+                  <a:srgbClr val="080808"/>
+                </a:solidFill>
+                <a:effectLst/>
+                <a:latin typeface="JetBrains Mono"/>
+              </a:rPr>
+              <a:t>    }</a:t>
+            </a:r>
+            <a:br>
+              <a:rPr lang="en-US" dirty="0">
+                <a:solidFill>
+                  <a:srgbClr val="080808"/>
+                </a:solidFill>
+                <a:effectLst/>
+                <a:latin typeface="JetBrains Mono"/>
+              </a:rPr>
+            </a:br>
+            <a:br>
+              <a:rPr lang="en-US" dirty="0">
+                <a:solidFill>
+                  <a:srgbClr val="080808"/>
+                </a:solidFill>
+                <a:effectLst/>
+                <a:latin typeface="JetBrains Mono"/>
+              </a:rPr>
+            </a:br>
+            <a:r>
+              <a:rPr lang="en-US" dirty="0">
+                <a:solidFill>
+                  <a:srgbClr val="080808"/>
+                </a:solidFill>
+                <a:effectLst/>
+                <a:latin typeface="JetBrains Mono"/>
+              </a:rPr>
+              <a:t>        </a:t>
+            </a:r>
+            <a:br>
+              <a:rPr lang="en-US" dirty="0">
+                <a:solidFill>
+                  <a:srgbClr val="080808"/>
+                </a:solidFill>
+                <a:effectLst/>
+                <a:latin typeface="JetBrains Mono"/>
+              </a:rPr>
+            </a:br>
+            <a:r>
+              <a:rPr lang="en-US" dirty="0">
+                <a:solidFill>
+                  <a:srgbClr val="080808"/>
+                </a:solidFill>
+                <a:effectLst/>
+                <a:latin typeface="JetBrains Mono"/>
+              </a:rPr>
+              <a:t>        </a:t>
+            </a:r>
+            <a:br>
+              <a:rPr lang="en-US" dirty="0">
+                <a:solidFill>
+                  <a:srgbClr val="080808"/>
+                </a:solidFill>
+                <a:effectLst/>
+                <a:latin typeface="JetBrains Mono"/>
+              </a:rPr>
+            </a:br>
+            <a:r>
+              <a:rPr lang="en-US" dirty="0">
+                <a:solidFill>
+                  <a:srgbClr val="080808"/>
+                </a:solidFill>
+                <a:effectLst/>
+                <a:latin typeface="JetBrains Mono"/>
+              </a:rPr>
+              <a:t>        </a:t>
+            </a:r>
+            <a:br>
+              <a:rPr lang="en-US" dirty="0">
+                <a:solidFill>
+                  <a:srgbClr val="080808"/>
+                </a:solidFill>
+                <a:effectLst/>
+                <a:latin typeface="JetBrains Mono"/>
+              </a:rPr>
+            </a:br>
+            <a:endParaRPr lang="en-US" dirty="0"/>
+          </a:p>
+        </p:txBody>
+      </p:sp>
+      <p:sp>
+        <p:nvSpPr>
+          <p:cNvPr id="6" name="TextBox 5">
+            <a:extLst>
+              <a:ext uri="{FF2B5EF4-FFF2-40B4-BE49-F238E27FC236}">
+                <a16:creationId xmlns:a16="http://schemas.microsoft.com/office/drawing/2014/main" id="{27E383AF-E96A-4273-B992-94BE889F33B6}"/>
+              </a:ext>
+            </a:extLst>
+          </p:cNvPr>
+          <p:cNvSpPr txBox="1"/>
+          <p:nvPr/>
+        </p:nvSpPr>
+        <p:spPr>
+          <a:xfrm>
+            <a:off x="4514129" y="65187"/>
+            <a:ext cx="4930815" cy="5078313"/>
+          </a:xfrm>
+          <a:prstGeom prst="rect">
+            <a:avLst/>
+          </a:prstGeom>
+          <a:noFill/>
+        </p:spPr>
+        <p:txBody>
+          <a:bodyPr wrap="square">
+            <a:spAutoFit/>
+          </a:bodyPr>
+          <a:lstStyle/>
+          <a:p>
+            <a:r>
+              <a:rPr lang="en-US" sz="1800" dirty="0">
+                <a:solidFill>
+                  <a:srgbClr val="080808"/>
+                </a:solidFill>
+                <a:effectLst/>
+                <a:latin typeface="JetBrains Mono"/>
+              </a:rPr>
+              <a:t> </a:t>
+            </a:r>
+            <a:r>
+              <a:rPr lang="en-US" sz="1800" dirty="0">
+                <a:solidFill>
+                  <a:srgbClr val="0033B3"/>
+                </a:solidFill>
+                <a:effectLst/>
+                <a:latin typeface="JetBrains Mono"/>
+              </a:rPr>
+              <a:t>public static void </a:t>
+            </a:r>
+            <a:r>
+              <a:rPr lang="en-US" sz="1800" dirty="0">
+                <a:solidFill>
+                  <a:srgbClr val="00627A"/>
+                </a:solidFill>
+                <a:effectLst/>
+                <a:latin typeface="JetBrains Mono"/>
+              </a:rPr>
+              <a:t>main</a:t>
+            </a:r>
+            <a:r>
+              <a:rPr lang="en-US" sz="1800" dirty="0">
+                <a:solidFill>
+                  <a:srgbClr val="080808"/>
+                </a:solidFill>
+                <a:effectLst/>
+                <a:latin typeface="JetBrains Mono"/>
+              </a:rPr>
+              <a:t>(</a:t>
+            </a:r>
+            <a:r>
+              <a:rPr lang="en-US" sz="1800" dirty="0">
+                <a:solidFill>
+                  <a:srgbClr val="000000"/>
+                </a:solidFill>
+                <a:effectLst/>
+                <a:latin typeface="JetBrains Mono"/>
+              </a:rPr>
+              <a:t>String</a:t>
+            </a:r>
+            <a:r>
+              <a:rPr lang="en-US" sz="1800" dirty="0">
+                <a:solidFill>
+                  <a:srgbClr val="080808"/>
+                </a:solidFill>
+                <a:effectLst/>
+                <a:latin typeface="JetBrains Mono"/>
+              </a:rPr>
+              <a:t>[] </a:t>
+            </a:r>
+            <a:r>
+              <a:rPr lang="en-US" sz="1800" dirty="0" err="1">
+                <a:solidFill>
+                  <a:srgbClr val="080808"/>
+                </a:solidFill>
+                <a:effectLst/>
+                <a:latin typeface="JetBrains Mono"/>
+              </a:rPr>
+              <a:t>args</a:t>
+            </a:r>
+            <a:r>
+              <a:rPr lang="en-US" sz="1800" dirty="0">
+                <a:solidFill>
+                  <a:srgbClr val="080808"/>
+                </a:solidFill>
+                <a:effectLst/>
+                <a:latin typeface="JetBrains Mono"/>
+              </a:rPr>
+              <a:t>) {</a:t>
+            </a:r>
+            <a:br>
+              <a:rPr lang="en-US" sz="1800" dirty="0">
+                <a:solidFill>
+                  <a:srgbClr val="080808"/>
+                </a:solidFill>
+                <a:effectLst/>
+                <a:latin typeface="JetBrains Mono"/>
+              </a:rPr>
+            </a:br>
+            <a:br>
+              <a:rPr lang="en-US" sz="1800" dirty="0">
+                <a:solidFill>
+                  <a:srgbClr val="080808"/>
+                </a:solidFill>
+                <a:effectLst/>
+                <a:latin typeface="JetBrains Mono"/>
+              </a:rPr>
+            </a:br>
+            <a:r>
+              <a:rPr lang="en-US" sz="1800" dirty="0">
+                <a:solidFill>
+                  <a:srgbClr val="080808"/>
+                </a:solidFill>
+                <a:effectLst/>
+                <a:latin typeface="JetBrains Mono"/>
+              </a:rPr>
+              <a:t>        </a:t>
+            </a:r>
+            <a:r>
+              <a:rPr lang="en-US" sz="1800" i="1" dirty="0">
+                <a:solidFill>
+                  <a:srgbClr val="8C8C8C"/>
+                </a:solidFill>
+                <a:effectLst/>
+                <a:latin typeface="JetBrains Mono"/>
+              </a:rPr>
+              <a:t>//per day fine, total day, reduction</a:t>
+            </a:r>
+            <a:br>
+              <a:rPr lang="en-US" sz="1800" i="1" dirty="0">
+                <a:solidFill>
+                  <a:srgbClr val="8C8C8C"/>
+                </a:solidFill>
+                <a:effectLst/>
+                <a:latin typeface="JetBrains Mono"/>
+              </a:rPr>
+            </a:br>
+            <a:r>
+              <a:rPr lang="en-US" sz="1800" i="1" dirty="0">
+                <a:solidFill>
+                  <a:srgbClr val="8C8C8C"/>
+                </a:solidFill>
+                <a:effectLst/>
+                <a:latin typeface="JetBrains Mono"/>
+              </a:rPr>
+              <a:t>        </a:t>
+            </a:r>
+            <a:r>
+              <a:rPr lang="en-US" sz="1800" dirty="0">
+                <a:solidFill>
+                  <a:srgbClr val="0033B3"/>
+                </a:solidFill>
+                <a:effectLst/>
+                <a:latin typeface="JetBrains Mono"/>
+              </a:rPr>
+              <a:t>int </a:t>
+            </a:r>
+            <a:r>
+              <a:rPr lang="en-US" sz="1800" dirty="0">
+                <a:solidFill>
+                  <a:srgbClr val="000000"/>
+                </a:solidFill>
+                <a:effectLst/>
+                <a:latin typeface="JetBrains Mono"/>
+              </a:rPr>
+              <a:t>a</a:t>
+            </a:r>
+            <a:r>
+              <a:rPr lang="en-US" sz="1800" dirty="0">
+                <a:solidFill>
+                  <a:srgbClr val="080808"/>
+                </a:solidFill>
+                <a:effectLst/>
+                <a:latin typeface="JetBrains Mono"/>
+              </a:rPr>
+              <a:t>=</a:t>
+            </a:r>
+            <a:r>
+              <a:rPr lang="en-US" sz="1800" dirty="0">
+                <a:solidFill>
+                  <a:srgbClr val="1750EB"/>
+                </a:solidFill>
+                <a:effectLst/>
+                <a:latin typeface="JetBrains Mono"/>
+              </a:rPr>
+              <a:t>10</a:t>
+            </a:r>
+            <a:r>
+              <a:rPr lang="en-US" sz="1800" dirty="0">
+                <a:solidFill>
+                  <a:srgbClr val="080808"/>
+                </a:solidFill>
+                <a:effectLst/>
+                <a:latin typeface="JetBrains Mono"/>
+              </a:rPr>
+              <a:t>,</a:t>
+            </a:r>
+            <a:r>
+              <a:rPr lang="en-US" sz="1800" dirty="0">
+                <a:solidFill>
+                  <a:srgbClr val="000000"/>
+                </a:solidFill>
+                <a:effectLst/>
+                <a:latin typeface="JetBrains Mono"/>
+              </a:rPr>
+              <a:t>b </a:t>
+            </a:r>
+            <a:r>
+              <a:rPr lang="en-US" sz="1800" dirty="0">
+                <a:solidFill>
+                  <a:srgbClr val="080808"/>
+                </a:solidFill>
+                <a:effectLst/>
+                <a:latin typeface="JetBrains Mono"/>
+              </a:rPr>
+              <a:t>= </a:t>
+            </a:r>
+            <a:r>
+              <a:rPr lang="en-US" sz="1800" dirty="0">
+                <a:solidFill>
+                  <a:srgbClr val="1750EB"/>
+                </a:solidFill>
+                <a:effectLst/>
+                <a:latin typeface="JetBrains Mono"/>
+              </a:rPr>
+              <a:t>3</a:t>
+            </a:r>
+            <a:r>
+              <a:rPr lang="en-US" sz="1800" dirty="0">
+                <a:solidFill>
+                  <a:srgbClr val="080808"/>
+                </a:solidFill>
+                <a:effectLst/>
+                <a:latin typeface="JetBrains Mono"/>
+              </a:rPr>
+              <a:t>, </a:t>
+            </a:r>
+            <a:r>
+              <a:rPr lang="en-US" sz="1800" dirty="0">
+                <a:solidFill>
+                  <a:srgbClr val="000000"/>
+                </a:solidFill>
+                <a:effectLst/>
+                <a:latin typeface="JetBrains Mono"/>
+              </a:rPr>
+              <a:t>r </a:t>
+            </a:r>
+            <a:r>
+              <a:rPr lang="en-US" sz="1800" dirty="0">
+                <a:solidFill>
+                  <a:srgbClr val="080808"/>
+                </a:solidFill>
+                <a:effectLst/>
+                <a:latin typeface="JetBrains Mono"/>
+              </a:rPr>
+              <a:t>= </a:t>
+            </a:r>
+            <a:r>
+              <a:rPr lang="en-US" sz="1800" dirty="0">
+                <a:solidFill>
+                  <a:srgbClr val="1750EB"/>
+                </a:solidFill>
+                <a:effectLst/>
+                <a:latin typeface="JetBrains Mono"/>
+              </a:rPr>
+              <a:t>13</a:t>
+            </a:r>
+            <a:r>
+              <a:rPr lang="en-US" sz="1800" dirty="0">
+                <a:solidFill>
+                  <a:srgbClr val="080808"/>
+                </a:solidFill>
+                <a:effectLst/>
+                <a:latin typeface="JetBrains Mono"/>
+              </a:rPr>
+              <a:t>;</a:t>
+            </a:r>
+            <a:br>
+              <a:rPr lang="en-US" sz="1800" dirty="0">
+                <a:solidFill>
+                  <a:srgbClr val="080808"/>
+                </a:solidFill>
+                <a:effectLst/>
+                <a:latin typeface="JetBrains Mono"/>
+              </a:rPr>
+            </a:br>
+            <a:br>
+              <a:rPr lang="en-US" sz="1800" dirty="0">
+                <a:solidFill>
+                  <a:srgbClr val="080808"/>
+                </a:solidFill>
+                <a:effectLst/>
+                <a:latin typeface="JetBrains Mono"/>
+              </a:rPr>
+            </a:br>
+            <a:r>
+              <a:rPr lang="en-US" sz="1800" dirty="0">
+                <a:solidFill>
+                  <a:srgbClr val="080808"/>
+                </a:solidFill>
+                <a:effectLst/>
+                <a:latin typeface="JetBrains Mono"/>
+              </a:rPr>
+              <a:t>        </a:t>
+            </a:r>
+            <a:r>
+              <a:rPr lang="en-US" sz="1800" dirty="0">
+                <a:solidFill>
+                  <a:srgbClr val="0033B3"/>
+                </a:solidFill>
+                <a:effectLst/>
+                <a:latin typeface="JetBrains Mono"/>
+              </a:rPr>
+              <a:t>if</a:t>
+            </a:r>
+            <a:r>
+              <a:rPr lang="en-US" sz="1800" dirty="0">
+                <a:solidFill>
+                  <a:srgbClr val="080808"/>
+                </a:solidFill>
+                <a:effectLst/>
+                <a:latin typeface="JetBrains Mono"/>
+              </a:rPr>
+              <a:t>(</a:t>
+            </a:r>
+            <a:r>
+              <a:rPr lang="en-US" sz="1800" i="1" dirty="0">
+                <a:solidFill>
+                  <a:srgbClr val="080808"/>
+                </a:solidFill>
+                <a:effectLst/>
+                <a:latin typeface="JetBrains Mono"/>
+              </a:rPr>
+              <a:t>fun1</a:t>
+            </a:r>
+            <a:r>
+              <a:rPr lang="en-US" sz="1800" dirty="0">
+                <a:solidFill>
+                  <a:srgbClr val="080808"/>
+                </a:solidFill>
+                <a:effectLst/>
+                <a:latin typeface="JetBrains Mono"/>
+              </a:rPr>
+              <a:t>(</a:t>
+            </a:r>
+            <a:r>
+              <a:rPr lang="en-US" sz="1800" dirty="0" err="1">
+                <a:solidFill>
+                  <a:srgbClr val="000000"/>
+                </a:solidFill>
+                <a:effectLst/>
+                <a:latin typeface="JetBrains Mono"/>
+              </a:rPr>
+              <a:t>b</a:t>
+            </a:r>
+            <a:r>
+              <a:rPr lang="en-US" sz="1800" dirty="0" err="1">
+                <a:solidFill>
+                  <a:srgbClr val="080808"/>
+                </a:solidFill>
+                <a:effectLst/>
+                <a:latin typeface="JetBrains Mono"/>
+              </a:rPr>
+              <a:t>,</a:t>
+            </a:r>
+            <a:r>
+              <a:rPr lang="en-US" sz="1800" dirty="0" err="1">
+                <a:solidFill>
+                  <a:srgbClr val="000000"/>
+                </a:solidFill>
+                <a:effectLst/>
+                <a:latin typeface="JetBrains Mono"/>
+              </a:rPr>
+              <a:t>a</a:t>
+            </a:r>
+            <a:r>
+              <a:rPr lang="en-US" sz="1800" dirty="0">
+                <a:solidFill>
+                  <a:srgbClr val="080808"/>
+                </a:solidFill>
+                <a:effectLst/>
+                <a:latin typeface="JetBrains Mono"/>
+              </a:rPr>
+              <a:t>))</a:t>
+            </a:r>
+            <a:br>
+              <a:rPr lang="en-US" sz="1800" dirty="0">
+                <a:solidFill>
+                  <a:srgbClr val="080808"/>
+                </a:solidFill>
+                <a:effectLst/>
+                <a:latin typeface="JetBrains Mono"/>
+              </a:rPr>
+            </a:br>
+            <a:r>
+              <a:rPr lang="en-US" sz="1800" dirty="0">
+                <a:solidFill>
+                  <a:srgbClr val="080808"/>
+                </a:solidFill>
+                <a:effectLst/>
+                <a:latin typeface="JetBrains Mono"/>
+              </a:rPr>
+              <a:t>        {</a:t>
+            </a:r>
+            <a:br>
+              <a:rPr lang="en-US" sz="1800" dirty="0">
+                <a:solidFill>
+                  <a:srgbClr val="080808"/>
+                </a:solidFill>
+                <a:effectLst/>
+                <a:latin typeface="JetBrains Mono"/>
+              </a:rPr>
+            </a:br>
+            <a:r>
+              <a:rPr lang="en-US" sz="1800" dirty="0">
+                <a:solidFill>
+                  <a:srgbClr val="080808"/>
+                </a:solidFill>
+                <a:effectLst/>
+                <a:latin typeface="JetBrains Mono"/>
+              </a:rPr>
+              <a:t>            </a:t>
+            </a:r>
+            <a:r>
+              <a:rPr lang="en-US" sz="1800" dirty="0" err="1">
+                <a:solidFill>
+                  <a:srgbClr val="000000"/>
+                </a:solidFill>
+                <a:effectLst/>
+                <a:latin typeface="JetBrains Mono"/>
+              </a:rPr>
+              <a:t>System</a:t>
+            </a:r>
+            <a:r>
+              <a:rPr lang="en-US" sz="1800" dirty="0" err="1">
+                <a:solidFill>
+                  <a:srgbClr val="080808"/>
+                </a:solidFill>
+                <a:effectLst/>
+                <a:latin typeface="JetBrains Mono"/>
+              </a:rPr>
+              <a:t>.</a:t>
+            </a:r>
+            <a:r>
+              <a:rPr lang="en-US" sz="1800" i="1" dirty="0" err="1">
+                <a:solidFill>
+                  <a:srgbClr val="871094"/>
+                </a:solidFill>
+                <a:effectLst/>
+                <a:latin typeface="JetBrains Mono"/>
+              </a:rPr>
+              <a:t>out</a:t>
+            </a:r>
+            <a:r>
+              <a:rPr lang="en-US" sz="1800" dirty="0" err="1">
+                <a:solidFill>
+                  <a:srgbClr val="080808"/>
+                </a:solidFill>
+                <a:effectLst/>
+                <a:latin typeface="JetBrains Mono"/>
+              </a:rPr>
+              <a:t>.println</a:t>
+            </a:r>
+            <a:r>
+              <a:rPr lang="en-US" sz="1800" dirty="0">
+                <a:solidFill>
+                  <a:srgbClr val="080808"/>
+                </a:solidFill>
+                <a:effectLst/>
+                <a:latin typeface="JetBrains Mono"/>
+              </a:rPr>
+              <a:t>(</a:t>
+            </a:r>
+            <a:r>
+              <a:rPr lang="en-US" sz="1800" dirty="0">
+                <a:solidFill>
+                  <a:srgbClr val="067D17"/>
+                </a:solidFill>
+                <a:effectLst/>
+                <a:latin typeface="JetBrains Mono"/>
+              </a:rPr>
+              <a:t>"Fined"</a:t>
+            </a:r>
+            <a:r>
+              <a:rPr lang="en-US" sz="1800" dirty="0">
+                <a:solidFill>
+                  <a:srgbClr val="080808"/>
+                </a:solidFill>
+                <a:effectLst/>
+                <a:latin typeface="JetBrains Mono"/>
+              </a:rPr>
+              <a:t>);</a:t>
+            </a:r>
+            <a:br>
+              <a:rPr lang="en-US" sz="1800" dirty="0">
+                <a:solidFill>
+                  <a:srgbClr val="080808"/>
+                </a:solidFill>
+                <a:effectLst/>
+                <a:latin typeface="JetBrains Mono"/>
+              </a:rPr>
+            </a:br>
+            <a:r>
+              <a:rPr lang="en-US" sz="1800" dirty="0">
+                <a:solidFill>
+                  <a:srgbClr val="080808"/>
+                </a:solidFill>
+                <a:effectLst/>
+                <a:latin typeface="JetBrains Mono"/>
+              </a:rPr>
+              <a:t>        }</a:t>
+            </a:r>
+            <a:br>
+              <a:rPr lang="en-US" sz="1800" dirty="0">
+                <a:solidFill>
+                  <a:srgbClr val="080808"/>
+                </a:solidFill>
+                <a:effectLst/>
+                <a:latin typeface="JetBrains Mono"/>
+              </a:rPr>
+            </a:br>
+            <a:r>
+              <a:rPr lang="en-US" sz="1800" dirty="0">
+                <a:solidFill>
+                  <a:srgbClr val="080808"/>
+                </a:solidFill>
+                <a:effectLst/>
+                <a:latin typeface="JetBrains Mono"/>
+              </a:rPr>
+              <a:t>        </a:t>
+            </a:r>
+            <a:r>
+              <a:rPr lang="en-US" sz="1800" dirty="0">
+                <a:solidFill>
+                  <a:srgbClr val="0033B3"/>
+                </a:solidFill>
+                <a:effectLst/>
+                <a:latin typeface="JetBrains Mono"/>
+              </a:rPr>
+              <a:t>else</a:t>
+            </a:r>
+            <a:br>
+              <a:rPr lang="en-US" sz="1800" dirty="0">
+                <a:solidFill>
+                  <a:srgbClr val="0033B3"/>
+                </a:solidFill>
+                <a:effectLst/>
+                <a:latin typeface="JetBrains Mono"/>
+              </a:rPr>
+            </a:br>
+            <a:r>
+              <a:rPr lang="en-US" sz="1800" dirty="0">
+                <a:solidFill>
+                  <a:srgbClr val="0033B3"/>
+                </a:solidFill>
+                <a:effectLst/>
+                <a:latin typeface="JetBrains Mono"/>
+              </a:rPr>
+              <a:t>        </a:t>
+            </a:r>
+            <a:r>
+              <a:rPr lang="en-US" sz="1800" dirty="0">
+                <a:solidFill>
+                  <a:srgbClr val="080808"/>
+                </a:solidFill>
+                <a:effectLst/>
+                <a:latin typeface="JetBrains Mono"/>
+              </a:rPr>
+              <a:t>{</a:t>
+            </a:r>
+            <a:br>
+              <a:rPr lang="en-US" sz="1800" dirty="0">
+                <a:solidFill>
+                  <a:srgbClr val="080808"/>
+                </a:solidFill>
+                <a:effectLst/>
+                <a:latin typeface="JetBrains Mono"/>
+              </a:rPr>
+            </a:br>
+            <a:r>
+              <a:rPr lang="en-US" sz="1800" dirty="0">
+                <a:solidFill>
+                  <a:srgbClr val="080808"/>
+                </a:solidFill>
+                <a:effectLst/>
+                <a:latin typeface="JetBrains Mono"/>
+              </a:rPr>
+              <a:t>            </a:t>
+            </a:r>
+            <a:r>
+              <a:rPr lang="en-US" sz="1800" dirty="0" err="1">
+                <a:solidFill>
+                  <a:srgbClr val="000000"/>
+                </a:solidFill>
+                <a:effectLst/>
+                <a:latin typeface="JetBrains Mono"/>
+              </a:rPr>
+              <a:t>System</a:t>
+            </a:r>
+            <a:r>
+              <a:rPr lang="en-US" sz="1800" dirty="0" err="1">
+                <a:solidFill>
+                  <a:srgbClr val="080808"/>
+                </a:solidFill>
+                <a:effectLst/>
+                <a:latin typeface="JetBrains Mono"/>
+              </a:rPr>
+              <a:t>.</a:t>
+            </a:r>
+            <a:r>
+              <a:rPr lang="en-US" sz="1800" i="1" dirty="0" err="1">
+                <a:solidFill>
+                  <a:srgbClr val="871094"/>
+                </a:solidFill>
+                <a:effectLst/>
+                <a:latin typeface="JetBrains Mono"/>
+              </a:rPr>
+              <a:t>out</a:t>
+            </a:r>
+            <a:r>
+              <a:rPr lang="en-US" sz="1800" dirty="0" err="1">
+                <a:solidFill>
+                  <a:srgbClr val="080808"/>
+                </a:solidFill>
+                <a:effectLst/>
+                <a:latin typeface="JetBrains Mono"/>
+              </a:rPr>
+              <a:t>.println</a:t>
+            </a:r>
+            <a:r>
+              <a:rPr lang="en-US" sz="1800" dirty="0">
+                <a:solidFill>
+                  <a:srgbClr val="080808"/>
+                </a:solidFill>
+                <a:effectLst/>
+                <a:latin typeface="JetBrains Mono"/>
+              </a:rPr>
+              <a:t>(</a:t>
+            </a:r>
+            <a:r>
+              <a:rPr lang="en-US" sz="1800" dirty="0">
+                <a:solidFill>
+                  <a:srgbClr val="067D17"/>
+                </a:solidFill>
+                <a:effectLst/>
+                <a:latin typeface="JetBrains Mono"/>
+              </a:rPr>
+              <a:t>"Not Fined"</a:t>
+            </a:r>
+            <a:r>
+              <a:rPr lang="en-US" sz="1800" dirty="0">
+                <a:solidFill>
+                  <a:srgbClr val="080808"/>
+                </a:solidFill>
+                <a:effectLst/>
+                <a:latin typeface="JetBrains Mono"/>
+              </a:rPr>
+              <a:t>);</a:t>
+            </a:r>
+            <a:br>
+              <a:rPr lang="en-US" sz="1800" dirty="0">
+                <a:solidFill>
+                  <a:srgbClr val="080808"/>
+                </a:solidFill>
+                <a:effectLst/>
+                <a:latin typeface="JetBrains Mono"/>
+              </a:rPr>
+            </a:br>
+            <a:r>
+              <a:rPr lang="en-US" sz="1800" dirty="0">
+                <a:solidFill>
+                  <a:srgbClr val="080808"/>
+                </a:solidFill>
+                <a:effectLst/>
+                <a:latin typeface="JetBrains Mono"/>
+              </a:rPr>
+              <a:t>        }</a:t>
+            </a:r>
+            <a:br>
+              <a:rPr lang="en-US" sz="1800" dirty="0">
+                <a:solidFill>
+                  <a:srgbClr val="080808"/>
+                </a:solidFill>
+                <a:effectLst/>
+                <a:latin typeface="JetBrains Mono"/>
+              </a:rPr>
+            </a:br>
+            <a:r>
+              <a:rPr lang="en-US" sz="1800" dirty="0">
+                <a:solidFill>
+                  <a:srgbClr val="080808"/>
+                </a:solidFill>
+                <a:effectLst/>
+                <a:latin typeface="JetBrains Mono"/>
+              </a:rPr>
+              <a:t>        </a:t>
+            </a:r>
+            <a:r>
+              <a:rPr lang="en-US" sz="1800" dirty="0">
+                <a:solidFill>
+                  <a:srgbClr val="0033B3"/>
+                </a:solidFill>
+                <a:effectLst/>
+                <a:latin typeface="JetBrains Mono"/>
+              </a:rPr>
+              <a:t>int </a:t>
+            </a:r>
+            <a:r>
+              <a:rPr lang="en-US" sz="1800" dirty="0">
+                <a:solidFill>
+                  <a:srgbClr val="000000"/>
+                </a:solidFill>
+                <a:effectLst/>
+                <a:latin typeface="JetBrains Mono"/>
+              </a:rPr>
+              <a:t>f </a:t>
+            </a:r>
+            <a:r>
+              <a:rPr lang="en-US" sz="1800" dirty="0">
+                <a:solidFill>
+                  <a:srgbClr val="080808"/>
+                </a:solidFill>
+                <a:effectLst/>
+                <a:latin typeface="JetBrains Mono"/>
+              </a:rPr>
+              <a:t>= (</a:t>
+            </a:r>
+            <a:r>
+              <a:rPr lang="en-US" sz="1800" dirty="0">
+                <a:solidFill>
+                  <a:srgbClr val="000000"/>
+                </a:solidFill>
+                <a:effectLst/>
+                <a:latin typeface="JetBrains Mono"/>
+              </a:rPr>
+              <a:t>a</a:t>
+            </a:r>
+            <a:r>
+              <a:rPr lang="en-US" sz="1800" dirty="0">
+                <a:solidFill>
+                  <a:srgbClr val="080808"/>
+                </a:solidFill>
+                <a:effectLst/>
+                <a:latin typeface="JetBrains Mono"/>
+              </a:rPr>
+              <a:t>*</a:t>
+            </a:r>
+            <a:r>
+              <a:rPr lang="en-US" sz="1800" dirty="0">
+                <a:solidFill>
+                  <a:srgbClr val="000000"/>
+                </a:solidFill>
+                <a:effectLst/>
+                <a:latin typeface="JetBrains Mono"/>
+              </a:rPr>
+              <a:t>b</a:t>
+            </a:r>
+            <a:r>
+              <a:rPr lang="en-US" sz="1800" dirty="0">
+                <a:solidFill>
+                  <a:srgbClr val="080808"/>
+                </a:solidFill>
+                <a:effectLst/>
+                <a:latin typeface="JetBrains Mono"/>
+              </a:rPr>
+              <a:t>)-</a:t>
+            </a:r>
+            <a:r>
+              <a:rPr lang="en-US" sz="1800" dirty="0">
+                <a:solidFill>
+                  <a:srgbClr val="000000"/>
+                </a:solidFill>
+                <a:effectLst/>
+                <a:latin typeface="JetBrains Mono"/>
+              </a:rPr>
+              <a:t>r</a:t>
+            </a:r>
+            <a:r>
+              <a:rPr lang="en-US" sz="1800" dirty="0">
+                <a:solidFill>
+                  <a:srgbClr val="080808"/>
+                </a:solidFill>
+                <a:effectLst/>
+                <a:latin typeface="JetBrains Mono"/>
+              </a:rPr>
+              <a:t>;</a:t>
+            </a:r>
+            <a:br>
+              <a:rPr lang="en-US" sz="1800" dirty="0">
+                <a:solidFill>
+                  <a:srgbClr val="080808"/>
+                </a:solidFill>
+                <a:effectLst/>
+                <a:latin typeface="JetBrains Mono"/>
+              </a:rPr>
+            </a:br>
+            <a:br>
+              <a:rPr lang="en-US" sz="1800" dirty="0">
+                <a:solidFill>
+                  <a:srgbClr val="080808"/>
+                </a:solidFill>
+                <a:effectLst/>
+                <a:latin typeface="JetBrains Mono"/>
+              </a:rPr>
+            </a:br>
+            <a:r>
+              <a:rPr lang="en-US" sz="1800" dirty="0">
+                <a:solidFill>
+                  <a:srgbClr val="080808"/>
+                </a:solidFill>
+                <a:effectLst/>
+                <a:latin typeface="JetBrains Mono"/>
+              </a:rPr>
+              <a:t>        </a:t>
+            </a:r>
+            <a:r>
+              <a:rPr lang="en-US" sz="1800" i="1" dirty="0">
+                <a:solidFill>
+                  <a:srgbClr val="8C8C8C"/>
+                </a:solidFill>
+                <a:effectLst/>
+                <a:latin typeface="JetBrains Mono"/>
+              </a:rPr>
+              <a:t>//Printing Fines and due date</a:t>
+            </a:r>
+            <a:br>
+              <a:rPr lang="en-US" sz="1800" i="1" dirty="0">
+                <a:solidFill>
+                  <a:srgbClr val="8C8C8C"/>
+                </a:solidFill>
+                <a:effectLst/>
+                <a:latin typeface="JetBrains Mono"/>
+              </a:rPr>
+            </a:br>
+            <a:r>
+              <a:rPr lang="en-US" sz="1800" i="1" dirty="0">
+                <a:solidFill>
+                  <a:srgbClr val="8C8C8C"/>
+                </a:solidFill>
+                <a:effectLst/>
+                <a:latin typeface="JetBrains Mono"/>
+              </a:rPr>
+              <a:t>        </a:t>
+            </a:r>
+            <a:r>
+              <a:rPr lang="en-US" sz="1800" dirty="0" err="1">
+                <a:solidFill>
+                  <a:srgbClr val="000000"/>
+                </a:solidFill>
+                <a:effectLst/>
+                <a:latin typeface="JetBrains Mono"/>
+              </a:rPr>
+              <a:t>System</a:t>
+            </a:r>
+            <a:r>
+              <a:rPr lang="en-US" sz="1800" dirty="0" err="1">
+                <a:solidFill>
+                  <a:srgbClr val="080808"/>
+                </a:solidFill>
+                <a:effectLst/>
+                <a:latin typeface="JetBrains Mono"/>
+              </a:rPr>
+              <a:t>.</a:t>
+            </a:r>
+            <a:r>
+              <a:rPr lang="en-US" sz="1800" i="1" dirty="0" err="1">
+                <a:solidFill>
+                  <a:srgbClr val="871094"/>
+                </a:solidFill>
+                <a:effectLst/>
+                <a:latin typeface="JetBrains Mono"/>
+              </a:rPr>
+              <a:t>out</a:t>
+            </a:r>
+            <a:r>
+              <a:rPr lang="en-US" sz="1800" dirty="0" err="1">
+                <a:solidFill>
+                  <a:srgbClr val="080808"/>
+                </a:solidFill>
+                <a:effectLst/>
+                <a:latin typeface="JetBrains Mono"/>
+              </a:rPr>
+              <a:t>.println</a:t>
+            </a:r>
+            <a:r>
+              <a:rPr lang="en-US" sz="1800" dirty="0">
+                <a:solidFill>
+                  <a:srgbClr val="080808"/>
+                </a:solidFill>
+                <a:effectLst/>
+                <a:latin typeface="JetBrains Mono"/>
+              </a:rPr>
+              <a:t>(</a:t>
+            </a:r>
+            <a:r>
+              <a:rPr lang="en-US" sz="1800" dirty="0">
+                <a:solidFill>
+                  <a:srgbClr val="000000"/>
+                </a:solidFill>
+                <a:effectLst/>
+                <a:latin typeface="JetBrains Mono"/>
+              </a:rPr>
+              <a:t>f+” “ +b</a:t>
+            </a:r>
+            <a:r>
+              <a:rPr lang="en-US" sz="1800" dirty="0">
+                <a:solidFill>
+                  <a:srgbClr val="080808"/>
+                </a:solidFill>
+                <a:effectLst/>
+                <a:latin typeface="JetBrains Mono"/>
+              </a:rPr>
+              <a:t>);</a:t>
+            </a:r>
+          </a:p>
+          <a:p>
+            <a:pPr marL="114300" indent="0">
+              <a:buNone/>
+            </a:pPr>
+            <a:r>
+              <a:rPr lang="en-US" sz="1800" dirty="0">
+                <a:solidFill>
+                  <a:srgbClr val="080808"/>
+                </a:solidFill>
+                <a:latin typeface="JetBrains Mono"/>
+              </a:rPr>
+              <a:t>}</a:t>
+            </a:r>
+            <a:endParaRPr lang="en-US" sz="1800" dirty="0"/>
+          </a:p>
+        </p:txBody>
+      </p:sp>
+      <p:cxnSp>
+        <p:nvCxnSpPr>
+          <p:cNvPr id="8" name="Straight Connector 7">
+            <a:extLst>
+              <a:ext uri="{FF2B5EF4-FFF2-40B4-BE49-F238E27FC236}">
+                <a16:creationId xmlns:a16="http://schemas.microsoft.com/office/drawing/2014/main" id="{DB3CC95B-32E3-43CE-817E-4E6CE4FDF1A9}"/>
+              </a:ext>
+            </a:extLst>
+          </p:cNvPr>
+          <p:cNvCxnSpPr/>
+          <p:nvPr/>
+        </p:nvCxnSpPr>
+        <p:spPr>
+          <a:xfrm>
+            <a:off x="4467828" y="445025"/>
+            <a:ext cx="0" cy="4045952"/>
+          </a:xfrm>
+          <a:prstGeom prst="line">
+            <a:avLst/>
+          </a:prstGeom>
+          <a:ln w="50800"/>
+        </p:spPr>
+        <p:style>
+          <a:lnRef idx="1">
+            <a:schemeClr val="accent1"/>
+          </a:lnRef>
+          <a:fillRef idx="0">
+            <a:schemeClr val="accent1"/>
+          </a:fillRef>
+          <a:effectRef idx="0">
+            <a:schemeClr val="accent1"/>
+          </a:effectRef>
+          <a:fontRef idx="minor">
+            <a:schemeClr val="tx1"/>
+          </a:fontRef>
+        </p:style>
+      </p:cxnSp>
+    </p:spTree>
+    <p:extLst>
+      <p:ext uri="{BB962C8B-B14F-4D97-AF65-F5344CB8AC3E}">
+        <p14:creationId xmlns:p14="http://schemas.microsoft.com/office/powerpoint/2010/main" val="232914633"/>
+      </p:ext>
+    </p:extLst>
+  </p:cSld>
+  <p:clrMapOvr>
+    <a:masterClrMapping/>
+  </p:clrMapOvr>
+</p:sld>
+</file>
+
+<file path=ppt/slides/slide26.xml><?xml version="1.0" encoding="utf-8"?>
+<p:sld xmlns:a="http://schemas.openxmlformats.org/drawingml/2006/main" xmlns:r="http://schemas.openxmlformats.org/officeDocument/2006/relationships" xmlns:p="http://schemas.openxmlformats.org/presentationml/2006/main">
+  <p:cSld>
+    <p:spTree>
+      <p:nvGrpSpPr>
         <p:cNvPr id="1" name="Shape 205"/>
         <p:cNvGrpSpPr/>
         <p:nvPr/>
@@ -17270,7 +18740,7 @@
 </p:sld>
 </file>
 
-<file path=ppt/slides/slide26.xml><?xml version="1.0" encoding="utf-8"?>
+<file path=ppt/slides/slide27.xml><?xml version="1.0" encoding="utf-8"?>
 <p:sld xmlns:a="http://schemas.openxmlformats.org/drawingml/2006/main" xmlns:r="http://schemas.openxmlformats.org/officeDocument/2006/relationships" xmlns:p="http://schemas.openxmlformats.org/presentationml/2006/main">
   <p:cSld>
     <p:spTree>
@@ -17492,7 +18962,7 @@
 </p:sld>
 </file>
 
-<file path=ppt/slides/slide27.xml><?xml version="1.0" encoding="utf-8"?>
+<file path=ppt/slides/slide28.xml><?xml version="1.0" encoding="utf-8"?>
 <p:sld xmlns:a="http://schemas.openxmlformats.org/drawingml/2006/main" xmlns:r="http://schemas.openxmlformats.org/officeDocument/2006/relationships" xmlns:p="http://schemas.openxmlformats.org/presentationml/2006/main">
   <p:cSld>
     <p:spTree>
@@ -17586,7 +19056,7 @@
               <a:buNone/>
             </a:pPr>
             <a:r>
-              <a:rPr lang="en" sz="2200">
+              <a:rPr lang="en" sz="2200" dirty="0">
                 <a:solidFill>
                   <a:srgbClr val="444444"/>
                 </a:solidFill>
@@ -17597,7 +19067,7 @@
               <a:t>The quickest way to find dead code is to use a good </a:t>
             </a:r>
             <a:r>
-              <a:rPr lang="en" sz="2200" b="1">
+              <a:rPr lang="en" sz="2200" b="1" dirty="0">
                 <a:solidFill>
                   <a:srgbClr val="444444"/>
                 </a:solidFill>
@@ -17608,7 +19078,7 @@
               <a:t>IDE</a:t>
             </a:r>
             <a:r>
-              <a:rPr lang="en" sz="2200">
+              <a:rPr lang="en" sz="2200" dirty="0">
                 <a:solidFill>
                   <a:srgbClr val="444444"/>
                 </a:solidFill>
@@ -17618,7 +19088,7 @@
               </a:rPr>
               <a:t>.</a:t>
             </a:r>
-            <a:endParaRPr sz="2200">
+            <a:endParaRPr sz="2200" dirty="0">
               <a:solidFill>
                 <a:srgbClr val="444444"/>
               </a:solidFill>
@@ -17643,7 +19113,7 @@
               <a:buChar char="●"/>
             </a:pPr>
             <a:r>
-              <a:rPr lang="en" sz="2200">
+              <a:rPr lang="en" sz="2200" dirty="0">
                 <a:solidFill>
                   <a:srgbClr val="444444"/>
                 </a:solidFill>
@@ -17653,7 +19123,7 @@
               </a:rPr>
               <a:t>Delete unused code and unneeded files.</a:t>
             </a:r>
-            <a:endParaRPr sz="2200">
+            <a:endParaRPr sz="2200" dirty="0">
               <a:solidFill>
                 <a:srgbClr val="444444"/>
               </a:solidFill>
@@ -17678,7 +19148,7 @@
               <a:buChar char="●"/>
             </a:pPr>
             <a:r>
-              <a:rPr lang="en" sz="2200">
+              <a:rPr lang="en" sz="2200" dirty="0">
                 <a:solidFill>
                   <a:srgbClr val="444444"/>
                 </a:solidFill>
@@ -17689,7 +19159,7 @@
               <a:t>In the case of an unnecessary class, </a:t>
             </a:r>
             <a:r>
-              <a:rPr lang="en" sz="2200" b="1">
+              <a:rPr lang="en" sz="2200" b="1" dirty="0">
                 <a:solidFill>
                   <a:srgbClr val="444444"/>
                 </a:solidFill>
@@ -17700,7 +19170,7 @@
               <a:t>Inline Class</a:t>
             </a:r>
             <a:r>
-              <a:rPr lang="en" sz="2200">
+              <a:rPr lang="en" sz="2200" dirty="0">
                 <a:solidFill>
                   <a:srgbClr val="444444"/>
                 </a:solidFill>
@@ -17711,7 +19181,7 @@
               <a:t> or </a:t>
             </a:r>
             <a:r>
-              <a:rPr lang="en" sz="2200" b="1">
+              <a:rPr lang="en" sz="2200" b="1" dirty="0">
                 <a:solidFill>
                   <a:srgbClr val="444444"/>
                 </a:solidFill>
@@ -17722,7 +19192,7 @@
               <a:t>Collapse Hierarchy</a:t>
             </a:r>
             <a:r>
-              <a:rPr lang="en" sz="2200">
+              <a:rPr lang="en" sz="2200" dirty="0">
                 <a:solidFill>
                   <a:srgbClr val="444444"/>
                 </a:solidFill>
@@ -17732,7 +19202,23 @@
               </a:rPr>
               <a:t> can be applied if a subclass or superclass is used.</a:t>
             </a:r>
-            <a:endParaRPr sz="2200">
+          </a:p>
+          <a:p>
+            <a:pPr marL="457200" lvl="0" indent="-368300" algn="l" rtl="0">
+              <a:spcBef>
+                <a:spcPts val="0"/>
+              </a:spcBef>
+              <a:spcAft>
+                <a:spcPts val="0"/>
+              </a:spcAft>
+              <a:buClr>
+                <a:srgbClr val="444444"/>
+              </a:buClr>
+              <a:buSzPts val="2200"/>
+              <a:buFont typeface="Arial"/>
+              <a:buChar char="●"/>
+            </a:pPr>
+            <a:endParaRPr sz="2200" dirty="0">
               <a:solidFill>
                 <a:srgbClr val="444444"/>
               </a:solidFill>
@@ -17757,7 +19243,7 @@
               <a:buChar char="●"/>
             </a:pPr>
             <a:r>
-              <a:rPr lang="en" sz="2200">
+              <a:rPr lang="en" sz="2200" dirty="0">
                 <a:solidFill>
                   <a:srgbClr val="444444"/>
                 </a:solidFill>
@@ -17768,7 +19254,7 @@
               <a:t>To remove unneeded parameters, use </a:t>
             </a:r>
             <a:r>
-              <a:rPr lang="en" sz="2200" b="1">
+              <a:rPr lang="en" sz="2200" b="1" dirty="0">
                 <a:solidFill>
                   <a:srgbClr val="444444"/>
                 </a:solidFill>
@@ -17779,7 +19265,7 @@
               <a:t>Remove Parameter</a:t>
             </a:r>
             <a:r>
-              <a:rPr lang="en" sz="2200">
+              <a:rPr lang="en" sz="2200" dirty="0">
                 <a:solidFill>
                   <a:srgbClr val="444444"/>
                 </a:solidFill>
@@ -17789,7 +19275,7 @@
               </a:rPr>
               <a:t>.</a:t>
             </a:r>
-            <a:endParaRPr sz="2200">
+            <a:endParaRPr sz="2200" dirty="0">
               <a:solidFill>
                 <a:srgbClr val="444444"/>
               </a:solidFill>
@@ -17811,7 +19297,7 @@
               </a:spcAft>
               <a:buNone/>
             </a:pPr>
-            <a:endParaRPr sz="2200">
+            <a:endParaRPr sz="2200" dirty="0">
               <a:solidFill>
                 <a:schemeClr val="dk2"/>
               </a:solidFill>
@@ -17830,7 +19316,7 @@
 </p:sld>
 </file>
 
-<file path=ppt/slides/slide28.xml><?xml version="1.0" encoding="utf-8"?>
+<file path=ppt/slides/slide29.xml><?xml version="1.0" encoding="utf-8"?>
 <p:sld xmlns:a="http://schemas.openxmlformats.org/drawingml/2006/main" xmlns:r="http://schemas.openxmlformats.org/officeDocument/2006/relationships" xmlns:p="http://schemas.openxmlformats.org/presentationml/2006/main">
   <p:cSld>
     <p:spTree>
@@ -17997,7 +19483,220 @@
 </p:sld>
 </file>
 
-<file path=ppt/slides/slide29.xml><?xml version="1.0" encoding="utf-8"?>
+<file path=ppt/slides/slide3.xml><?xml version="1.0" encoding="utf-8"?>
+<p:sld xmlns:a="http://schemas.openxmlformats.org/drawingml/2006/main" xmlns:r="http://schemas.openxmlformats.org/officeDocument/2006/relationships" xmlns:p="http://schemas.openxmlformats.org/presentationml/2006/main">
+  <p:cSld>
+    <p:spTree>
+      <p:nvGrpSpPr>
+        <p:cNvPr id="1" name="Shape 68"/>
+        <p:cNvGrpSpPr/>
+        <p:nvPr/>
+      </p:nvGrpSpPr>
+      <p:grpSpPr>
+        <a:xfrm>
+          <a:off x="0" y="0"/>
+          <a:ext cx="0" cy="0"/>
+          <a:chOff x="0" y="0"/>
+          <a:chExt cx="0" cy="0"/>
+        </a:xfrm>
+      </p:grpSpPr>
+      <p:sp>
+        <p:nvSpPr>
+          <p:cNvPr id="69" name="Google Shape;69;p15"/>
+          <p:cNvSpPr txBox="1">
+            <a:spLocks noGrp="1"/>
+          </p:cNvSpPr>
+          <p:nvPr>
+            <p:ph type="title"/>
+          </p:nvPr>
+        </p:nvSpPr>
+        <p:spPr>
+          <a:xfrm>
+            <a:off x="311700" y="445025"/>
+            <a:ext cx="8520600" cy="623400"/>
+          </a:xfrm>
+          <a:prstGeom prst="rect">
+            <a:avLst/>
+          </a:prstGeom>
+        </p:spPr>
+        <p:txBody>
+          <a:bodyPr spcFirstLastPara="1" wrap="square" lIns="91425" tIns="91425" rIns="91425" bIns="91425" anchor="t" anchorCtr="0">
+            <a:noAutofit/>
+          </a:bodyPr>
+          <a:lstStyle/>
+          <a:p>
+            <a:pPr marL="0" lvl="0" indent="0" algn="l" rtl="0">
+              <a:spcBef>
+                <a:spcPts val="0"/>
+              </a:spcBef>
+              <a:spcAft>
+                <a:spcPts val="0"/>
+              </a:spcAft>
+              <a:buNone/>
+            </a:pPr>
+            <a:r>
+              <a:rPr lang="en"/>
+              <a:t>Refactoring</a:t>
+            </a:r>
+            <a:endParaRPr/>
+          </a:p>
+        </p:txBody>
+      </p:sp>
+      <p:sp>
+        <p:nvSpPr>
+          <p:cNvPr id="70" name="Google Shape;70;p15"/>
+          <p:cNvSpPr txBox="1">
+            <a:spLocks noGrp="1"/>
+          </p:cNvSpPr>
+          <p:nvPr>
+            <p:ph type="body" idx="1"/>
+          </p:nvPr>
+        </p:nvSpPr>
+        <p:spPr>
+          <a:xfrm>
+            <a:off x="311700" y="1152475"/>
+            <a:ext cx="8520600" cy="3416400"/>
+          </a:xfrm>
+          <a:prstGeom prst="rect">
+            <a:avLst/>
+          </a:prstGeom>
+        </p:spPr>
+        <p:txBody>
+          <a:bodyPr spcFirstLastPara="1" wrap="square" lIns="91425" tIns="91425" rIns="91425" bIns="91425" anchor="ctr" anchorCtr="0">
+            <a:noAutofit/>
+          </a:bodyPr>
+          <a:lstStyle/>
+          <a:p>
+            <a:pPr marL="0" lvl="0" indent="0" algn="just" rtl="0">
+              <a:spcBef>
+                <a:spcPts val="0"/>
+              </a:spcBef>
+              <a:spcAft>
+                <a:spcPts val="0"/>
+              </a:spcAft>
+              <a:buClr>
+                <a:schemeClr val="dk2"/>
+              </a:buClr>
+              <a:buSzPts val="1100"/>
+              <a:buFont typeface="Arial"/>
+              <a:buNone/>
+            </a:pPr>
+            <a:r>
+              <a:rPr lang="en" sz="2500">
+                <a:solidFill>
+                  <a:srgbClr val="444444"/>
+                </a:solidFill>
+                <a:highlight>
+                  <a:srgbClr val="FFFFFF"/>
+                </a:highlight>
+              </a:rPr>
+              <a:t>Refactoring is a </a:t>
+            </a:r>
+            <a:r>
+              <a:rPr lang="en" sz="2500" b="1">
+                <a:solidFill>
+                  <a:srgbClr val="444444"/>
+                </a:solidFill>
+                <a:highlight>
+                  <a:srgbClr val="FFFFFF"/>
+                </a:highlight>
+              </a:rPr>
+              <a:t>systematic process</a:t>
+            </a:r>
+            <a:r>
+              <a:rPr lang="en" sz="2500">
+                <a:solidFill>
+                  <a:srgbClr val="444444"/>
+                </a:solidFill>
+                <a:highlight>
+                  <a:srgbClr val="FFFFFF"/>
+                </a:highlight>
+              </a:rPr>
+              <a:t> of </a:t>
+            </a:r>
+            <a:r>
+              <a:rPr lang="en" sz="2500" b="1">
+                <a:solidFill>
+                  <a:srgbClr val="444444"/>
+                </a:solidFill>
+                <a:highlight>
+                  <a:srgbClr val="FFFFFF"/>
+                </a:highlight>
+              </a:rPr>
+              <a:t>improving code</a:t>
+            </a:r>
+            <a:r>
+              <a:rPr lang="en" sz="2500">
+                <a:solidFill>
+                  <a:srgbClr val="444444"/>
+                </a:solidFill>
+                <a:highlight>
+                  <a:srgbClr val="FFFFFF"/>
+                </a:highlight>
+              </a:rPr>
+              <a:t> </a:t>
+            </a:r>
+            <a:r>
+              <a:rPr lang="en" sz="2500" b="1">
+                <a:solidFill>
+                  <a:srgbClr val="444444"/>
+                </a:solidFill>
+                <a:highlight>
+                  <a:srgbClr val="FFFFFF"/>
+                </a:highlight>
+              </a:rPr>
+              <a:t>without creating new functionality</a:t>
+            </a:r>
+            <a:r>
+              <a:rPr lang="en" sz="2500">
+                <a:solidFill>
+                  <a:srgbClr val="444444"/>
+                </a:solidFill>
+                <a:highlight>
+                  <a:srgbClr val="FFFFFF"/>
+                </a:highlight>
+              </a:rPr>
+              <a:t> that can transform a mess into clean code and simple design.</a:t>
+            </a:r>
+            <a:endParaRPr sz="2500">
+              <a:solidFill>
+                <a:srgbClr val="444444"/>
+              </a:solidFill>
+              <a:highlight>
+                <a:srgbClr val="FFFFFF"/>
+              </a:highlight>
+            </a:endParaRPr>
+          </a:p>
+          <a:p>
+            <a:pPr marL="0" lvl="0" indent="0" algn="just" rtl="0">
+              <a:spcBef>
+                <a:spcPts val="1200"/>
+              </a:spcBef>
+              <a:spcAft>
+                <a:spcPts val="1200"/>
+              </a:spcAft>
+              <a:buNone/>
+            </a:pPr>
+            <a:endParaRPr sz="2500">
+              <a:solidFill>
+                <a:schemeClr val="accent1"/>
+              </a:solidFill>
+              <a:highlight>
+                <a:srgbClr val="FFFFFF"/>
+              </a:highlight>
+            </a:endParaRPr>
+          </a:p>
+        </p:txBody>
+      </p:sp>
+    </p:spTree>
+  </p:cSld>
+  <p:clrMapOvr>
+    <a:masterClrMapping/>
+  </p:clrMapOvr>
+</p:sld>
+</file>
+
+<file path=ppt/slides/slide30.xml><?xml version="1.0" encoding="utf-8"?>
 <p:sld xmlns:a="http://schemas.openxmlformats.org/drawingml/2006/main" xmlns:r="http://schemas.openxmlformats.org/officeDocument/2006/relationships" xmlns:p="http://schemas.openxmlformats.org/presentationml/2006/main">
   <p:cSld>
     <p:spTree>
@@ -18406,220 +20105,7 @@
 </p:sld>
 </file>
 
-<file path=ppt/slides/slide3.xml><?xml version="1.0" encoding="utf-8"?>
-<p:sld xmlns:a="http://schemas.openxmlformats.org/drawingml/2006/main" xmlns:r="http://schemas.openxmlformats.org/officeDocument/2006/relationships" xmlns:p="http://schemas.openxmlformats.org/presentationml/2006/main">
-  <p:cSld>
-    <p:spTree>
-      <p:nvGrpSpPr>
-        <p:cNvPr id="1" name="Shape 68"/>
-        <p:cNvGrpSpPr/>
-        <p:nvPr/>
-      </p:nvGrpSpPr>
-      <p:grpSpPr>
-        <a:xfrm>
-          <a:off x="0" y="0"/>
-          <a:ext cx="0" cy="0"/>
-          <a:chOff x="0" y="0"/>
-          <a:chExt cx="0" cy="0"/>
-        </a:xfrm>
-      </p:grpSpPr>
-      <p:sp>
-        <p:nvSpPr>
-          <p:cNvPr id="69" name="Google Shape;69;p15"/>
-          <p:cNvSpPr txBox="1">
-            <a:spLocks noGrp="1"/>
-          </p:cNvSpPr>
-          <p:nvPr>
-            <p:ph type="title"/>
-          </p:nvPr>
-        </p:nvSpPr>
-        <p:spPr>
-          <a:xfrm>
-            <a:off x="311700" y="445025"/>
-            <a:ext cx="8520600" cy="623400"/>
-          </a:xfrm>
-          <a:prstGeom prst="rect">
-            <a:avLst/>
-          </a:prstGeom>
-        </p:spPr>
-        <p:txBody>
-          <a:bodyPr spcFirstLastPara="1" wrap="square" lIns="91425" tIns="91425" rIns="91425" bIns="91425" anchor="t" anchorCtr="0">
-            <a:noAutofit/>
-          </a:bodyPr>
-          <a:lstStyle/>
-          <a:p>
-            <a:pPr marL="0" lvl="0" indent="0" algn="l" rtl="0">
-              <a:spcBef>
-                <a:spcPts val="0"/>
-              </a:spcBef>
-              <a:spcAft>
-                <a:spcPts val="0"/>
-              </a:spcAft>
-              <a:buNone/>
-            </a:pPr>
-            <a:r>
-              <a:rPr lang="en"/>
-              <a:t>Refactoring</a:t>
-            </a:r>
-            <a:endParaRPr/>
-          </a:p>
-        </p:txBody>
-      </p:sp>
-      <p:sp>
-        <p:nvSpPr>
-          <p:cNvPr id="70" name="Google Shape;70;p15"/>
-          <p:cNvSpPr txBox="1">
-            <a:spLocks noGrp="1"/>
-          </p:cNvSpPr>
-          <p:nvPr>
-            <p:ph type="body" idx="1"/>
-          </p:nvPr>
-        </p:nvSpPr>
-        <p:spPr>
-          <a:xfrm>
-            <a:off x="311700" y="1152475"/>
-            <a:ext cx="8520600" cy="3416400"/>
-          </a:xfrm>
-          <a:prstGeom prst="rect">
-            <a:avLst/>
-          </a:prstGeom>
-        </p:spPr>
-        <p:txBody>
-          <a:bodyPr spcFirstLastPara="1" wrap="square" lIns="91425" tIns="91425" rIns="91425" bIns="91425" anchor="ctr" anchorCtr="0">
-            <a:noAutofit/>
-          </a:bodyPr>
-          <a:lstStyle/>
-          <a:p>
-            <a:pPr marL="0" lvl="0" indent="0" algn="just" rtl="0">
-              <a:spcBef>
-                <a:spcPts val="0"/>
-              </a:spcBef>
-              <a:spcAft>
-                <a:spcPts val="0"/>
-              </a:spcAft>
-              <a:buClr>
-                <a:schemeClr val="dk2"/>
-              </a:buClr>
-              <a:buSzPts val="1100"/>
-              <a:buFont typeface="Arial"/>
-              <a:buNone/>
-            </a:pPr>
-            <a:r>
-              <a:rPr lang="en" sz="2500">
-                <a:solidFill>
-                  <a:srgbClr val="444444"/>
-                </a:solidFill>
-                <a:highlight>
-                  <a:srgbClr val="FFFFFF"/>
-                </a:highlight>
-              </a:rPr>
-              <a:t>Refactoring is a </a:t>
-            </a:r>
-            <a:r>
-              <a:rPr lang="en" sz="2500" b="1">
-                <a:solidFill>
-                  <a:srgbClr val="444444"/>
-                </a:solidFill>
-                <a:highlight>
-                  <a:srgbClr val="FFFFFF"/>
-                </a:highlight>
-              </a:rPr>
-              <a:t>systematic process</a:t>
-            </a:r>
-            <a:r>
-              <a:rPr lang="en" sz="2500">
-                <a:solidFill>
-                  <a:srgbClr val="444444"/>
-                </a:solidFill>
-                <a:highlight>
-                  <a:srgbClr val="FFFFFF"/>
-                </a:highlight>
-              </a:rPr>
-              <a:t> of </a:t>
-            </a:r>
-            <a:r>
-              <a:rPr lang="en" sz="2500" b="1">
-                <a:solidFill>
-                  <a:srgbClr val="444444"/>
-                </a:solidFill>
-                <a:highlight>
-                  <a:srgbClr val="FFFFFF"/>
-                </a:highlight>
-              </a:rPr>
-              <a:t>improving code</a:t>
-            </a:r>
-            <a:r>
-              <a:rPr lang="en" sz="2500">
-                <a:solidFill>
-                  <a:srgbClr val="444444"/>
-                </a:solidFill>
-                <a:highlight>
-                  <a:srgbClr val="FFFFFF"/>
-                </a:highlight>
-              </a:rPr>
-              <a:t> </a:t>
-            </a:r>
-            <a:r>
-              <a:rPr lang="en" sz="2500" b="1">
-                <a:solidFill>
-                  <a:srgbClr val="444444"/>
-                </a:solidFill>
-                <a:highlight>
-                  <a:srgbClr val="FFFFFF"/>
-                </a:highlight>
-              </a:rPr>
-              <a:t>without creating new functionality</a:t>
-            </a:r>
-            <a:r>
-              <a:rPr lang="en" sz="2500">
-                <a:solidFill>
-                  <a:srgbClr val="444444"/>
-                </a:solidFill>
-                <a:highlight>
-                  <a:srgbClr val="FFFFFF"/>
-                </a:highlight>
-              </a:rPr>
-              <a:t> that can transform a mess into clean code and simple design.</a:t>
-            </a:r>
-            <a:endParaRPr sz="2500">
-              <a:solidFill>
-                <a:srgbClr val="444444"/>
-              </a:solidFill>
-              <a:highlight>
-                <a:srgbClr val="FFFFFF"/>
-              </a:highlight>
-            </a:endParaRPr>
-          </a:p>
-          <a:p>
-            <a:pPr marL="0" lvl="0" indent="0" algn="just" rtl="0">
-              <a:spcBef>
-                <a:spcPts val="1200"/>
-              </a:spcBef>
-              <a:spcAft>
-                <a:spcPts val="1200"/>
-              </a:spcAft>
-              <a:buNone/>
-            </a:pPr>
-            <a:endParaRPr sz="2500">
-              <a:solidFill>
-                <a:schemeClr val="accent1"/>
-              </a:solidFill>
-              <a:highlight>
-                <a:srgbClr val="FFFFFF"/>
-              </a:highlight>
-            </a:endParaRPr>
-          </a:p>
-        </p:txBody>
-      </p:sp>
-    </p:spTree>
-  </p:cSld>
-  <p:clrMapOvr>
-    <a:masterClrMapping/>
-  </p:clrMapOvr>
-</p:sld>
-</file>
-
-<file path=ppt/slides/slide30.xml><?xml version="1.0" encoding="utf-8"?>
+<file path=ppt/slides/slide31.xml><?xml version="1.0" encoding="utf-8"?>
 <p:sld xmlns:a="http://schemas.openxmlformats.org/drawingml/2006/main" xmlns:r="http://schemas.openxmlformats.org/officeDocument/2006/relationships" xmlns:p="http://schemas.openxmlformats.org/presentationml/2006/main">
   <p:cSld>
     <p:spTree>
@@ -19024,7 +20510,7 @@
 </p:sld>
 </file>
 
-<file path=ppt/slides/slide31.xml><?xml version="1.0" encoding="utf-8"?>
+<file path=ppt/slides/slide32.xml><?xml version="1.0" encoding="utf-8"?>
 <p:sld xmlns:a="http://schemas.openxmlformats.org/drawingml/2006/main" xmlns:r="http://schemas.openxmlformats.org/officeDocument/2006/relationships" xmlns:p="http://schemas.openxmlformats.org/presentationml/2006/main">
   <p:cSld>
     <p:spTree>
@@ -19417,7 +20903,856 @@
 </p:sld>
 </file>
 
-<file path=ppt/slides/slide32.xml><?xml version="1.0" encoding="utf-8"?>
+<file path=ppt/slides/slide33.xml><?xml version="1.0" encoding="utf-8"?>
+<p:sld xmlns:a="http://schemas.openxmlformats.org/drawingml/2006/main" xmlns:r="http://schemas.openxmlformats.org/officeDocument/2006/relationships" xmlns:p="http://schemas.openxmlformats.org/presentationml/2006/main">
+  <p:cSld>
+    <p:spTree>
+      <p:nvGrpSpPr>
+        <p:cNvPr id="1" name=""/>
+        <p:cNvGrpSpPr/>
+        <p:nvPr/>
+      </p:nvGrpSpPr>
+      <p:grpSpPr>
+        <a:xfrm>
+          <a:off x="0" y="0"/>
+          <a:ext cx="0" cy="0"/>
+          <a:chOff x="0" y="0"/>
+          <a:chExt cx="0" cy="0"/>
+        </a:xfrm>
+      </p:grpSpPr>
+      <p:sp>
+        <p:nvSpPr>
+          <p:cNvPr id="2" name="Title 1">
+            <a:extLst>
+              <a:ext uri="{FF2B5EF4-FFF2-40B4-BE49-F238E27FC236}">
+                <a16:creationId xmlns:a16="http://schemas.microsoft.com/office/drawing/2014/main" id="{8B15B285-2692-476E-8D6A-3532682E3C3A}"/>
+              </a:ext>
+            </a:extLst>
+          </p:cNvPr>
+          <p:cNvSpPr>
+            <a:spLocks noGrp="1"/>
+          </p:cNvSpPr>
+          <p:nvPr>
+            <p:ph type="title"/>
+          </p:nvPr>
+        </p:nvSpPr>
+        <p:spPr/>
+        <p:txBody>
+          <a:bodyPr/>
+          <a:lstStyle/>
+          <a:p>
+            <a:r>
+              <a:rPr lang="en-US" dirty="0"/>
+              <a:t>Classwork 2</a:t>
+            </a:r>
+          </a:p>
+        </p:txBody>
+      </p:sp>
+      <p:sp>
+        <p:nvSpPr>
+          <p:cNvPr id="3" name="Text Placeholder 2">
+            <a:extLst>
+              <a:ext uri="{FF2B5EF4-FFF2-40B4-BE49-F238E27FC236}">
+                <a16:creationId xmlns:a16="http://schemas.microsoft.com/office/drawing/2014/main" id="{FE307B16-DBFF-4D89-8518-B3304650C8D9}"/>
+              </a:ext>
+            </a:extLst>
+          </p:cNvPr>
+          <p:cNvSpPr>
+            <a:spLocks noGrp="1"/>
+          </p:cNvSpPr>
+          <p:nvPr>
+            <p:ph type="body" idx="1"/>
+          </p:nvPr>
+        </p:nvSpPr>
+        <p:spPr>
+          <a:xfrm>
+            <a:off x="311700" y="1097161"/>
+            <a:ext cx="3733652" cy="3416400"/>
+          </a:xfrm>
+        </p:spPr>
+        <p:txBody>
+          <a:bodyPr/>
+          <a:lstStyle/>
+          <a:p>
+            <a:pPr marL="114300" indent="0">
+              <a:buNone/>
+            </a:pPr>
+            <a:r>
+              <a:rPr lang="en-US" dirty="0">
+                <a:solidFill>
+                  <a:srgbClr val="0033B3"/>
+                </a:solidFill>
+                <a:effectLst/>
+                <a:latin typeface="JetBrains Mono"/>
+              </a:rPr>
+              <a:t>class </a:t>
+            </a:r>
+            <a:r>
+              <a:rPr lang="en-US" dirty="0">
+                <a:solidFill>
+                  <a:srgbClr val="000000"/>
+                </a:solidFill>
+                <a:effectLst/>
+                <a:latin typeface="JetBrains Mono"/>
+              </a:rPr>
+              <a:t>A </a:t>
+            </a:r>
+            <a:r>
+              <a:rPr lang="en-US" dirty="0">
+                <a:solidFill>
+                  <a:srgbClr val="080808"/>
+                </a:solidFill>
+                <a:effectLst/>
+                <a:latin typeface="JetBrains Mono"/>
+              </a:rPr>
+              <a:t>{</a:t>
+            </a:r>
+            <a:br>
+              <a:rPr lang="en-US" dirty="0">
+                <a:solidFill>
+                  <a:srgbClr val="080808"/>
+                </a:solidFill>
+                <a:effectLst/>
+                <a:latin typeface="JetBrains Mono"/>
+              </a:rPr>
+            </a:br>
+            <a:r>
+              <a:rPr lang="en-US" dirty="0">
+                <a:solidFill>
+                  <a:srgbClr val="080808"/>
+                </a:solidFill>
+                <a:effectLst/>
+                <a:latin typeface="JetBrains Mono"/>
+              </a:rPr>
+              <a:t>    </a:t>
+            </a:r>
+            <a:r>
+              <a:rPr lang="en-US" dirty="0">
+                <a:solidFill>
+                  <a:srgbClr val="000000"/>
+                </a:solidFill>
+                <a:effectLst/>
+                <a:latin typeface="JetBrains Mono"/>
+              </a:rPr>
+              <a:t>String </a:t>
+            </a:r>
+            <a:r>
+              <a:rPr lang="en-US" dirty="0">
+                <a:solidFill>
+                  <a:srgbClr val="871094"/>
+                </a:solidFill>
+                <a:effectLst/>
+                <a:latin typeface="JetBrains Mono"/>
+              </a:rPr>
+              <a:t>n</a:t>
+            </a:r>
+            <a:r>
+              <a:rPr lang="en-US" dirty="0">
+                <a:solidFill>
+                  <a:srgbClr val="080808"/>
+                </a:solidFill>
+                <a:effectLst/>
+                <a:latin typeface="JetBrains Mono"/>
+              </a:rPr>
+              <a:t>, </a:t>
+            </a:r>
+            <a:r>
+              <a:rPr lang="en-US" dirty="0">
+                <a:solidFill>
+                  <a:srgbClr val="871094"/>
+                </a:solidFill>
+                <a:effectLst/>
+                <a:latin typeface="JetBrains Mono"/>
+              </a:rPr>
+              <a:t>add</a:t>
+            </a:r>
+            <a:r>
+              <a:rPr lang="en-US" dirty="0">
+                <a:solidFill>
+                  <a:srgbClr val="080808"/>
+                </a:solidFill>
+                <a:effectLst/>
+                <a:latin typeface="JetBrains Mono"/>
+              </a:rPr>
+              <a:t>;    </a:t>
+            </a:r>
+            <a:br>
+              <a:rPr lang="en-US" dirty="0">
+                <a:solidFill>
+                  <a:srgbClr val="080808"/>
+                </a:solidFill>
+                <a:effectLst/>
+                <a:latin typeface="JetBrains Mono"/>
+              </a:rPr>
+            </a:br>
+            <a:r>
+              <a:rPr lang="en-US" dirty="0">
+                <a:solidFill>
+                  <a:srgbClr val="0033B3"/>
+                </a:solidFill>
+                <a:effectLst/>
+                <a:latin typeface="JetBrains Mono"/>
+              </a:rPr>
+              <a:t>public void </a:t>
+            </a:r>
+            <a:r>
+              <a:rPr lang="en-US" dirty="0">
+                <a:solidFill>
+                  <a:srgbClr val="00627A"/>
+                </a:solidFill>
+                <a:effectLst/>
+                <a:latin typeface="JetBrains Mono"/>
+              </a:rPr>
+              <a:t>ss</a:t>
+            </a:r>
+            <a:r>
+              <a:rPr lang="en-US" dirty="0">
+                <a:solidFill>
+                  <a:srgbClr val="080808"/>
+                </a:solidFill>
+                <a:effectLst/>
+                <a:latin typeface="JetBrains Mono"/>
+              </a:rPr>
+              <a:t>(</a:t>
+            </a:r>
+            <a:r>
+              <a:rPr lang="en-US" dirty="0">
+                <a:solidFill>
+                  <a:srgbClr val="000000"/>
+                </a:solidFill>
+                <a:effectLst/>
+                <a:latin typeface="JetBrains Mono"/>
+              </a:rPr>
+              <a:t>String </a:t>
+            </a:r>
+            <a:r>
+              <a:rPr lang="en-US" dirty="0">
+                <a:solidFill>
+                  <a:srgbClr val="080808"/>
+                </a:solidFill>
+                <a:effectLst/>
+                <a:latin typeface="JetBrains Mono"/>
+              </a:rPr>
+              <a:t>n, String add) {</a:t>
+            </a:r>
+            <a:br>
+              <a:rPr lang="en-US" dirty="0">
+                <a:solidFill>
+                  <a:srgbClr val="080808"/>
+                </a:solidFill>
+                <a:effectLst/>
+                <a:latin typeface="JetBrains Mono"/>
+              </a:rPr>
+            </a:br>
+            <a:r>
+              <a:rPr lang="en-US" dirty="0">
+                <a:solidFill>
+                  <a:srgbClr val="080808"/>
+                </a:solidFill>
+                <a:effectLst/>
+                <a:latin typeface="JetBrains Mono"/>
+              </a:rPr>
+              <a:t>        </a:t>
+            </a:r>
+            <a:r>
+              <a:rPr lang="en-US" dirty="0" err="1">
+                <a:solidFill>
+                  <a:srgbClr val="0033B3"/>
+                </a:solidFill>
+                <a:effectLst/>
+                <a:latin typeface="JetBrains Mono"/>
+              </a:rPr>
+              <a:t>this</a:t>
+            </a:r>
+            <a:r>
+              <a:rPr lang="en-US" dirty="0" err="1">
+                <a:solidFill>
+                  <a:srgbClr val="080808"/>
+                </a:solidFill>
+                <a:effectLst/>
+                <a:latin typeface="JetBrains Mono"/>
+              </a:rPr>
+              <a:t>.</a:t>
+            </a:r>
+            <a:r>
+              <a:rPr lang="en-US" dirty="0" err="1">
+                <a:solidFill>
+                  <a:srgbClr val="871094"/>
+                </a:solidFill>
+                <a:effectLst/>
+                <a:latin typeface="JetBrains Mono"/>
+              </a:rPr>
+              <a:t>n</a:t>
+            </a:r>
+            <a:r>
+              <a:rPr lang="en-US" dirty="0">
+                <a:solidFill>
+                  <a:srgbClr val="871094"/>
+                </a:solidFill>
+                <a:effectLst/>
+                <a:latin typeface="JetBrains Mono"/>
+              </a:rPr>
+              <a:t> </a:t>
+            </a:r>
+            <a:r>
+              <a:rPr lang="en-US" dirty="0">
+                <a:solidFill>
+                  <a:srgbClr val="080808"/>
+                </a:solidFill>
+                <a:effectLst/>
+                <a:latin typeface="JetBrains Mono"/>
+              </a:rPr>
+              <a:t>= n;</a:t>
+            </a:r>
+          </a:p>
+          <a:p>
+            <a:pPr marL="114300" indent="0">
+              <a:buNone/>
+            </a:pPr>
+            <a:r>
+              <a:rPr lang="en-US" dirty="0">
+                <a:solidFill>
+                  <a:srgbClr val="080808"/>
+                </a:solidFill>
+                <a:latin typeface="JetBrains Mono"/>
+              </a:rPr>
+              <a:t>        </a:t>
+            </a:r>
+            <a:r>
+              <a:rPr lang="en-US" dirty="0" err="1">
+                <a:solidFill>
+                  <a:srgbClr val="0033B3"/>
+                </a:solidFill>
+                <a:effectLst/>
+                <a:latin typeface="JetBrains Mono"/>
+              </a:rPr>
+              <a:t>this</a:t>
+            </a:r>
+            <a:r>
+              <a:rPr lang="en-US" dirty="0" err="1">
+                <a:solidFill>
+                  <a:srgbClr val="080808"/>
+                </a:solidFill>
+                <a:effectLst/>
+                <a:latin typeface="JetBrains Mono"/>
+              </a:rPr>
+              <a:t>.</a:t>
+            </a:r>
+            <a:r>
+              <a:rPr lang="en-US" dirty="0" err="1">
+                <a:solidFill>
+                  <a:srgbClr val="871094"/>
+                </a:solidFill>
+                <a:effectLst/>
+                <a:latin typeface="JetBrains Mono"/>
+              </a:rPr>
+              <a:t>add</a:t>
+            </a:r>
+            <a:r>
+              <a:rPr lang="en-US" dirty="0">
+                <a:solidFill>
+                  <a:srgbClr val="871094"/>
+                </a:solidFill>
+                <a:effectLst/>
+                <a:latin typeface="JetBrains Mono"/>
+              </a:rPr>
+              <a:t> </a:t>
+            </a:r>
+            <a:r>
+              <a:rPr lang="en-US" dirty="0">
+                <a:solidFill>
+                  <a:srgbClr val="080808"/>
+                </a:solidFill>
+                <a:effectLst/>
+                <a:latin typeface="JetBrains Mono"/>
+              </a:rPr>
+              <a:t>= add;</a:t>
+            </a:r>
+            <a:r>
+              <a:rPr lang="en-US" dirty="0">
+                <a:solidFill>
+                  <a:srgbClr val="080808"/>
+                </a:solidFill>
+                <a:latin typeface="JetBrains Mono"/>
+              </a:rPr>
+              <a:t>	</a:t>
+            </a:r>
+            <a:br>
+              <a:rPr lang="en-US" dirty="0">
+                <a:solidFill>
+                  <a:srgbClr val="080808"/>
+                </a:solidFill>
+                <a:effectLst/>
+                <a:latin typeface="JetBrains Mono"/>
+              </a:rPr>
+            </a:br>
+            <a:r>
+              <a:rPr lang="en-US" dirty="0">
+                <a:solidFill>
+                  <a:srgbClr val="080808"/>
+                </a:solidFill>
+                <a:effectLst/>
+                <a:latin typeface="JetBrains Mono"/>
+              </a:rPr>
+              <a:t>    }</a:t>
+            </a:r>
+            <a:br>
+              <a:rPr lang="en-US" dirty="0">
+                <a:solidFill>
+                  <a:srgbClr val="080808"/>
+                </a:solidFill>
+                <a:effectLst/>
+                <a:latin typeface="JetBrains Mono"/>
+              </a:rPr>
+            </a:br>
+            <a:r>
+              <a:rPr lang="en-US" dirty="0">
+                <a:solidFill>
+                  <a:srgbClr val="0033B3"/>
+                </a:solidFill>
+                <a:effectLst/>
+                <a:latin typeface="JetBrains Mono"/>
+              </a:rPr>
+              <a:t>class </a:t>
+            </a:r>
+            <a:r>
+              <a:rPr lang="en-US" dirty="0" err="1">
+                <a:solidFill>
+                  <a:srgbClr val="000000"/>
+                </a:solidFill>
+                <a:effectLst/>
+                <a:latin typeface="JetBrains Mono"/>
+              </a:rPr>
+              <a:t>cust</a:t>
+            </a:r>
+            <a:r>
+              <a:rPr lang="en-US" dirty="0">
+                <a:solidFill>
+                  <a:srgbClr val="000000"/>
+                </a:solidFill>
+                <a:effectLst/>
+                <a:latin typeface="JetBrains Mono"/>
+              </a:rPr>
+              <a:t> </a:t>
+            </a:r>
+            <a:r>
+              <a:rPr lang="en-US" dirty="0">
+                <a:solidFill>
+                  <a:srgbClr val="0033B3"/>
+                </a:solidFill>
+                <a:effectLst/>
+                <a:latin typeface="JetBrains Mono"/>
+              </a:rPr>
+              <a:t>extends </a:t>
+            </a:r>
+            <a:r>
+              <a:rPr lang="en-US" dirty="0">
+                <a:solidFill>
+                  <a:srgbClr val="000000"/>
+                </a:solidFill>
+                <a:effectLst/>
+                <a:latin typeface="JetBrains Mono"/>
+              </a:rPr>
+              <a:t>A</a:t>
+            </a:r>
+            <a:r>
+              <a:rPr lang="en-US" dirty="0">
+                <a:solidFill>
+                  <a:srgbClr val="080808"/>
+                </a:solidFill>
+                <a:effectLst/>
+                <a:latin typeface="JetBrains Mono"/>
+              </a:rPr>
+              <a:t>{</a:t>
+            </a:r>
+            <a:br>
+              <a:rPr lang="en-US" dirty="0">
+                <a:solidFill>
+                  <a:srgbClr val="080808"/>
+                </a:solidFill>
+                <a:effectLst/>
+                <a:latin typeface="JetBrains Mono"/>
+              </a:rPr>
+            </a:br>
+            <a:r>
+              <a:rPr lang="en-US" dirty="0">
+                <a:solidFill>
+                  <a:srgbClr val="080808"/>
+                </a:solidFill>
+                <a:effectLst/>
+                <a:latin typeface="JetBrains Mono"/>
+              </a:rPr>
+              <a:t>    </a:t>
+            </a:r>
+            <a:br>
+              <a:rPr lang="en-US" dirty="0">
+                <a:solidFill>
+                  <a:srgbClr val="080808"/>
+                </a:solidFill>
+                <a:effectLst/>
+                <a:latin typeface="JetBrains Mono"/>
+              </a:rPr>
+            </a:br>
+            <a:r>
+              <a:rPr lang="en-US" dirty="0">
+                <a:solidFill>
+                  <a:srgbClr val="080808"/>
+                </a:solidFill>
+                <a:effectLst/>
+                <a:latin typeface="JetBrains Mono"/>
+              </a:rPr>
+              <a:t>}</a:t>
+            </a:r>
+            <a:br>
+              <a:rPr lang="en-US" dirty="0">
+                <a:solidFill>
+                  <a:srgbClr val="080808"/>
+                </a:solidFill>
+                <a:effectLst/>
+                <a:latin typeface="JetBrains Mono"/>
+              </a:rPr>
+            </a:br>
+            <a:br>
+              <a:rPr lang="en-US" dirty="0">
+                <a:solidFill>
+                  <a:srgbClr val="080808"/>
+                </a:solidFill>
+                <a:effectLst/>
+                <a:latin typeface="JetBrains Mono"/>
+              </a:rPr>
+            </a:br>
+            <a:br>
+              <a:rPr lang="en-US" dirty="0">
+                <a:solidFill>
+                  <a:srgbClr val="080808"/>
+                </a:solidFill>
+                <a:effectLst/>
+                <a:latin typeface="JetBrains Mono"/>
+              </a:rPr>
+            </a:br>
+            <a:br>
+              <a:rPr lang="en-US" dirty="0">
+                <a:solidFill>
+                  <a:srgbClr val="080808"/>
+                </a:solidFill>
+                <a:effectLst/>
+                <a:latin typeface="JetBrains Mono"/>
+              </a:rPr>
+            </a:br>
+            <a:br>
+              <a:rPr lang="en-US" dirty="0">
+                <a:solidFill>
+                  <a:srgbClr val="080808"/>
+                </a:solidFill>
+                <a:effectLst/>
+                <a:latin typeface="JetBrains Mono"/>
+              </a:rPr>
+            </a:br>
+            <a:endParaRPr lang="en-US" dirty="0">
+              <a:solidFill>
+                <a:srgbClr val="080808"/>
+              </a:solidFill>
+              <a:effectLst/>
+              <a:latin typeface="JetBrains Mono"/>
+            </a:endParaRPr>
+          </a:p>
+          <a:p>
+            <a:pPr marL="114300" indent="0">
+              <a:buNone/>
+            </a:pPr>
+            <a:endParaRPr lang="en-US" dirty="0"/>
+          </a:p>
+        </p:txBody>
+      </p:sp>
+      <p:sp>
+        <p:nvSpPr>
+          <p:cNvPr id="7" name="TextBox 6">
+            <a:extLst>
+              <a:ext uri="{FF2B5EF4-FFF2-40B4-BE49-F238E27FC236}">
+                <a16:creationId xmlns:a16="http://schemas.microsoft.com/office/drawing/2014/main" id="{74F3A4AF-AAD2-4469-A983-C75427C0DE42}"/>
+              </a:ext>
+            </a:extLst>
+          </p:cNvPr>
+          <p:cNvSpPr txBox="1"/>
+          <p:nvPr/>
+        </p:nvSpPr>
+        <p:spPr>
+          <a:xfrm>
+            <a:off x="5492186" y="1635810"/>
+            <a:ext cx="4572000" cy="1477328"/>
+          </a:xfrm>
+          <a:prstGeom prst="rect">
+            <a:avLst/>
+          </a:prstGeom>
+          <a:noFill/>
+        </p:spPr>
+        <p:txBody>
+          <a:bodyPr wrap="square">
+            <a:spAutoFit/>
+          </a:bodyPr>
+          <a:lstStyle/>
+          <a:p>
+            <a:r>
+              <a:rPr lang="en-US" sz="1800" dirty="0" err="1">
+                <a:solidFill>
+                  <a:srgbClr val="000000"/>
+                </a:solidFill>
+                <a:effectLst/>
+                <a:latin typeface="JetBrains Mono"/>
+              </a:rPr>
+              <a:t>cust</a:t>
+            </a:r>
+            <a:r>
+              <a:rPr lang="en-US" sz="1800" dirty="0">
+                <a:solidFill>
+                  <a:srgbClr val="000000"/>
+                </a:solidFill>
+                <a:effectLst/>
+                <a:latin typeface="JetBrains Mono"/>
+              </a:rPr>
+              <a:t> dm1 </a:t>
+            </a:r>
+            <a:r>
+              <a:rPr lang="en-US" sz="1800" dirty="0">
+                <a:solidFill>
+                  <a:srgbClr val="080808"/>
+                </a:solidFill>
+                <a:effectLst/>
+                <a:latin typeface="JetBrains Mono"/>
+              </a:rPr>
+              <a:t>= </a:t>
+            </a:r>
+            <a:r>
+              <a:rPr lang="en-US" sz="1800" dirty="0">
+                <a:solidFill>
+                  <a:srgbClr val="0033B3"/>
+                </a:solidFill>
+                <a:effectLst/>
+                <a:latin typeface="JetBrains Mono"/>
+              </a:rPr>
+              <a:t>new </a:t>
+            </a:r>
+            <a:r>
+              <a:rPr lang="en-US" sz="1800" dirty="0" err="1">
+                <a:solidFill>
+                  <a:srgbClr val="080808"/>
+                </a:solidFill>
+                <a:effectLst/>
+                <a:latin typeface="JetBrains Mono"/>
+              </a:rPr>
+              <a:t>cust</a:t>
+            </a:r>
+            <a:r>
+              <a:rPr lang="en-US" sz="1800" dirty="0">
+                <a:solidFill>
+                  <a:srgbClr val="080808"/>
+                </a:solidFill>
+                <a:effectLst/>
+                <a:latin typeface="JetBrains Mono"/>
+              </a:rPr>
+              <a:t>();</a:t>
+            </a:r>
+            <a:br>
+              <a:rPr lang="en-US" sz="1800" dirty="0">
+                <a:solidFill>
+                  <a:srgbClr val="080808"/>
+                </a:solidFill>
+                <a:effectLst/>
+                <a:latin typeface="JetBrains Mono"/>
+              </a:rPr>
+            </a:br>
+            <a:r>
+              <a:rPr lang="en-US" sz="1800" dirty="0">
+                <a:solidFill>
+                  <a:srgbClr val="080808"/>
+                </a:solidFill>
+                <a:effectLst/>
+                <a:latin typeface="JetBrains Mono"/>
+              </a:rPr>
+              <a:t>        </a:t>
+            </a:r>
+            <a:br>
+              <a:rPr lang="en-US" sz="1800" dirty="0">
+                <a:solidFill>
+                  <a:srgbClr val="080808"/>
+                </a:solidFill>
+                <a:effectLst/>
+                <a:latin typeface="JetBrains Mono"/>
+              </a:rPr>
+            </a:br>
+            <a:r>
+              <a:rPr lang="en-US" sz="1800" dirty="0">
+                <a:solidFill>
+                  <a:srgbClr val="080808"/>
+                </a:solidFill>
+                <a:effectLst/>
+                <a:latin typeface="JetBrains Mono"/>
+              </a:rPr>
+              <a:t>        </a:t>
+            </a:r>
+            <a:r>
+              <a:rPr lang="en-US" sz="1800" dirty="0">
+                <a:solidFill>
+                  <a:srgbClr val="000000"/>
+                </a:solidFill>
+                <a:effectLst/>
+                <a:latin typeface="JetBrains Mono"/>
+              </a:rPr>
+              <a:t>dm1</a:t>
+            </a:r>
+            <a:r>
+              <a:rPr lang="en-US" sz="1800" dirty="0">
+                <a:solidFill>
+                  <a:srgbClr val="080808"/>
+                </a:solidFill>
+                <a:effectLst/>
+                <a:latin typeface="JetBrains Mono"/>
+              </a:rPr>
+              <a:t>.setN(</a:t>
+            </a:r>
+            <a:r>
+              <a:rPr lang="en-US" sz="1800" dirty="0">
+                <a:solidFill>
+                  <a:srgbClr val="067D17"/>
+                </a:solidFill>
+                <a:effectLst/>
+                <a:latin typeface="JetBrains Mono"/>
+              </a:rPr>
+              <a:t>"Abrar"</a:t>
+            </a:r>
+            <a:r>
+              <a:rPr lang="en-US" sz="1800" dirty="0">
+                <a:solidFill>
+                  <a:srgbClr val="080808"/>
+                </a:solidFill>
+                <a:effectLst/>
+                <a:latin typeface="JetBrains Mono"/>
+              </a:rPr>
+              <a:t>);</a:t>
+            </a:r>
+            <a:br>
+              <a:rPr lang="en-US" sz="1800" dirty="0">
+                <a:solidFill>
+                  <a:srgbClr val="080808"/>
+                </a:solidFill>
+                <a:effectLst/>
+                <a:latin typeface="JetBrains Mono"/>
+              </a:rPr>
+            </a:br>
+            <a:r>
+              <a:rPr lang="en-US" sz="1800" dirty="0">
+                <a:solidFill>
+                  <a:srgbClr val="080808"/>
+                </a:solidFill>
+                <a:effectLst/>
+                <a:latin typeface="JetBrains Mono"/>
+              </a:rPr>
+              <a:t>        </a:t>
+            </a:r>
+            <a:r>
+              <a:rPr lang="en-US" sz="1800" dirty="0">
+                <a:solidFill>
+                  <a:srgbClr val="000000"/>
+                </a:solidFill>
+                <a:effectLst/>
+                <a:latin typeface="JetBrains Mono"/>
+              </a:rPr>
+              <a:t>dm1</a:t>
+            </a:r>
+            <a:r>
+              <a:rPr lang="en-US" sz="1800" dirty="0">
+                <a:solidFill>
+                  <a:srgbClr val="080808"/>
+                </a:solidFill>
+                <a:effectLst/>
+                <a:latin typeface="JetBrains Mono"/>
+              </a:rPr>
+              <a:t>.setAdd(</a:t>
+            </a:r>
+            <a:r>
+              <a:rPr lang="en-US" sz="1800" dirty="0">
+                <a:solidFill>
+                  <a:srgbClr val="067D17"/>
+                </a:solidFill>
+                <a:effectLst/>
+                <a:latin typeface="JetBrains Mono"/>
+              </a:rPr>
+              <a:t>"Mirpur"</a:t>
+            </a:r>
+            <a:r>
+              <a:rPr lang="en-US" sz="1800" dirty="0">
+                <a:solidFill>
+                  <a:srgbClr val="080808"/>
+                </a:solidFill>
+                <a:effectLst/>
+                <a:latin typeface="JetBrains Mono"/>
+              </a:rPr>
+              <a:t>);    </a:t>
+            </a:r>
+            <a:br>
+              <a:rPr lang="en-US" sz="1800" dirty="0">
+                <a:solidFill>
+                  <a:srgbClr val="080808"/>
+                </a:solidFill>
+                <a:effectLst/>
+                <a:latin typeface="JetBrains Mono"/>
+              </a:rPr>
+            </a:br>
+            <a:endParaRPr lang="en-US" sz="1800" dirty="0"/>
+          </a:p>
+        </p:txBody>
+      </p:sp>
+      <p:cxnSp>
+        <p:nvCxnSpPr>
+          <p:cNvPr id="9" name="Straight Connector 8">
+            <a:extLst>
+              <a:ext uri="{FF2B5EF4-FFF2-40B4-BE49-F238E27FC236}">
+                <a16:creationId xmlns:a16="http://schemas.microsoft.com/office/drawing/2014/main" id="{8F14EC94-6FFF-4CB9-8042-7AD949E9AEF3}"/>
+              </a:ext>
+            </a:extLst>
+          </p:cNvPr>
+          <p:cNvCxnSpPr/>
+          <p:nvPr/>
+        </p:nvCxnSpPr>
+        <p:spPr>
+          <a:xfrm>
+            <a:off x="4815068" y="548774"/>
+            <a:ext cx="0" cy="4045952"/>
+          </a:xfrm>
+          <a:prstGeom prst="line">
+            <a:avLst/>
+          </a:prstGeom>
+          <a:ln w="50800"/>
+        </p:spPr>
+        <p:style>
+          <a:lnRef idx="1">
+            <a:schemeClr val="accent1"/>
+          </a:lnRef>
+          <a:fillRef idx="0">
+            <a:schemeClr val="accent1"/>
+          </a:fillRef>
+          <a:effectRef idx="0">
+            <a:schemeClr val="accent1"/>
+          </a:effectRef>
+          <a:fontRef idx="minor">
+            <a:schemeClr val="tx1"/>
+          </a:fontRef>
+        </p:style>
+      </p:cxnSp>
+    </p:spTree>
+    <p:extLst>
+      <p:ext uri="{BB962C8B-B14F-4D97-AF65-F5344CB8AC3E}">
+        <p14:creationId xmlns:p14="http://schemas.microsoft.com/office/powerpoint/2010/main" val="625864061"/>
+      </p:ext>
+    </p:extLst>
+  </p:cSld>
+  <p:clrMapOvr>
+    <a:masterClrMapping/>
+  </p:clrMapOvr>
+</p:sld>
+</file>
+
+<file path=ppt/slides/slide34.xml><?xml version="1.0" encoding="utf-8"?>
 <p:sld xmlns:a="http://schemas.openxmlformats.org/drawingml/2006/main" xmlns:r="http://schemas.openxmlformats.org/officeDocument/2006/relationships" xmlns:p="http://schemas.openxmlformats.org/presentationml/2006/main">
   <p:cSld>
     <p:spTree>
@@ -19484,7 +21819,7 @@
 </p:sld>
 </file>
 
-<file path=ppt/slides/slide33.xml><?xml version="1.0" encoding="utf-8"?>
+<file path=ppt/slides/slide35.xml><?xml version="1.0" encoding="utf-8"?>
 <p:sld xmlns:a="http://schemas.openxmlformats.org/drawingml/2006/main" xmlns:r="http://schemas.openxmlformats.org/officeDocument/2006/relationships" xmlns:p="http://schemas.openxmlformats.org/presentationml/2006/main">
   <p:cSld>
     <p:spTree>
@@ -19709,7 +22044,7 @@
 </p:sld>
 </file>
 
-<file path=ppt/slides/slide34.xml><?xml version="1.0" encoding="utf-8"?>
+<file path=ppt/slides/slide36.xml><?xml version="1.0" encoding="utf-8"?>
 <p:sld xmlns:a="http://schemas.openxmlformats.org/drawingml/2006/main" xmlns:r="http://schemas.openxmlformats.org/officeDocument/2006/relationships" xmlns:p="http://schemas.openxmlformats.org/presentationml/2006/main">
   <p:cSld>
     <p:spTree>
@@ -20027,7 +22362,7 @@
 </p:sld>
 </file>
 
-<file path=ppt/slides/slide35.xml><?xml version="1.0" encoding="utf-8"?>
+<file path=ppt/slides/slide37.xml><?xml version="1.0" encoding="utf-8"?>
 <p:sld xmlns:a="http://schemas.openxmlformats.org/drawingml/2006/main" xmlns:r="http://schemas.openxmlformats.org/officeDocument/2006/relationships" xmlns:p="http://schemas.openxmlformats.org/presentationml/2006/main">
   <p:cSld>
     <p:spTree>
@@ -20420,7 +22755,7 @@
 </p:sld>
 </file>
 
-<file path=ppt/slides/slide36.xml><?xml version="1.0" encoding="utf-8"?>
+<file path=ppt/slides/slide38.xml><?xml version="1.0" encoding="utf-8"?>
 <p:sld xmlns:a="http://schemas.openxmlformats.org/drawingml/2006/main" xmlns:r="http://schemas.openxmlformats.org/officeDocument/2006/relationships" xmlns:p="http://schemas.openxmlformats.org/presentationml/2006/main">
   <p:cSld>
     <p:spTree>
@@ -20813,7 +23148,7 @@
 </p:sld>
 </file>
 
-<file path=ppt/slides/slide37.xml><?xml version="1.0" encoding="utf-8"?>
+<file path=ppt/slides/slide39.xml><?xml version="1.0" encoding="utf-8"?>
 <p:sld xmlns:a="http://schemas.openxmlformats.org/drawingml/2006/main" xmlns:r="http://schemas.openxmlformats.org/officeDocument/2006/relationships" xmlns:p="http://schemas.openxmlformats.org/presentationml/2006/main">
   <p:cSld>
     <p:spTree>
@@ -21206,7 +23541,368 @@
 </p:sld>
 </file>
 
-<file path=ppt/slides/slide38.xml><?xml version="1.0" encoding="utf-8"?>
+<file path=ppt/slides/slide4.xml><?xml version="1.0" encoding="utf-8"?>
+<p:sld xmlns:a="http://schemas.openxmlformats.org/drawingml/2006/main" xmlns:r="http://schemas.openxmlformats.org/officeDocument/2006/relationships" xmlns:p="http://schemas.openxmlformats.org/presentationml/2006/main">
+  <p:cSld>
+    <p:spTree>
+      <p:nvGrpSpPr>
+        <p:cNvPr id="1" name="Shape 74"/>
+        <p:cNvGrpSpPr/>
+        <p:nvPr/>
+      </p:nvGrpSpPr>
+      <p:grpSpPr>
+        <a:xfrm>
+          <a:off x="0" y="0"/>
+          <a:ext cx="0" cy="0"/>
+          <a:chOff x="0" y="0"/>
+          <a:chExt cx="0" cy="0"/>
+        </a:xfrm>
+      </p:grpSpPr>
+      <p:sp>
+        <p:nvSpPr>
+          <p:cNvPr id="75" name="Google Shape;75;p16"/>
+          <p:cNvSpPr txBox="1">
+            <a:spLocks noGrp="1"/>
+          </p:cNvSpPr>
+          <p:nvPr>
+            <p:ph type="title"/>
+          </p:nvPr>
+        </p:nvSpPr>
+        <p:spPr>
+          <a:xfrm>
+            <a:off x="311700" y="445025"/>
+            <a:ext cx="8520600" cy="623400"/>
+          </a:xfrm>
+          <a:prstGeom prst="rect">
+            <a:avLst/>
+          </a:prstGeom>
+        </p:spPr>
+        <p:txBody>
+          <a:bodyPr spcFirstLastPara="1" wrap="square" lIns="91425" tIns="91425" rIns="91425" bIns="91425" anchor="t" anchorCtr="0">
+            <a:noAutofit/>
+          </a:bodyPr>
+          <a:lstStyle/>
+          <a:p>
+            <a:pPr marL="0" lvl="0" indent="0" algn="l" rtl="0">
+              <a:spcBef>
+                <a:spcPts val="0"/>
+              </a:spcBef>
+              <a:spcAft>
+                <a:spcPts val="0"/>
+              </a:spcAft>
+              <a:buNone/>
+            </a:pPr>
+            <a:r>
+              <a:rPr lang="en"/>
+              <a:t>Clean Code</a:t>
+            </a:r>
+            <a:endParaRPr/>
+          </a:p>
+        </p:txBody>
+      </p:sp>
+      <p:sp>
+        <p:nvSpPr>
+          <p:cNvPr id="76" name="Google Shape;76;p16"/>
+          <p:cNvSpPr txBox="1">
+            <a:spLocks noGrp="1"/>
+          </p:cNvSpPr>
+          <p:nvPr>
+            <p:ph type="body" idx="1"/>
+          </p:nvPr>
+        </p:nvSpPr>
+        <p:spPr>
+          <a:xfrm>
+            <a:off x="311700" y="1152475"/>
+            <a:ext cx="8520600" cy="3416400"/>
+          </a:xfrm>
+          <a:prstGeom prst="rect">
+            <a:avLst/>
+          </a:prstGeom>
+        </p:spPr>
+        <p:txBody>
+          <a:bodyPr spcFirstLastPara="1" wrap="square" lIns="91425" tIns="91425" rIns="91425" bIns="91425" anchor="t" anchorCtr="0">
+            <a:noAutofit/>
+          </a:bodyPr>
+          <a:lstStyle/>
+          <a:p>
+            <a:pPr marL="0" lvl="0" indent="0" algn="l" rtl="0">
+              <a:spcBef>
+                <a:spcPts val="0"/>
+              </a:spcBef>
+              <a:spcAft>
+                <a:spcPts val="0"/>
+              </a:spcAft>
+              <a:buNone/>
+            </a:pPr>
+            <a:r>
+              <a:rPr lang="en" sz="2000">
+                <a:solidFill>
+                  <a:srgbClr val="444444"/>
+                </a:solidFill>
+                <a:highlight>
+                  <a:srgbClr val="FFFFFF"/>
+                </a:highlight>
+              </a:rPr>
+              <a:t>The main purpose of refactoring is to fight technical debt. It transforms a mess into clean code and simple design.</a:t>
+            </a:r>
+            <a:endParaRPr sz="2000">
+              <a:solidFill>
+                <a:srgbClr val="444444"/>
+              </a:solidFill>
+              <a:highlight>
+                <a:srgbClr val="FFFFFF"/>
+              </a:highlight>
+              <a:latin typeface="Source Sans Pro"/>
+              <a:ea typeface="Source Sans Pro"/>
+              <a:cs typeface="Source Sans Pro"/>
+              <a:sym typeface="Source Sans Pro"/>
+            </a:endParaRPr>
+          </a:p>
+          <a:p>
+            <a:pPr marL="457200" lvl="0" indent="-355600" algn="l" rtl="0">
+              <a:spcBef>
+                <a:spcPts val="1600"/>
+              </a:spcBef>
+              <a:spcAft>
+                <a:spcPts val="0"/>
+              </a:spcAft>
+              <a:buClr>
+                <a:srgbClr val="444444"/>
+              </a:buClr>
+              <a:buSzPts val="2000"/>
+              <a:buFont typeface="Source Sans Pro"/>
+              <a:buAutoNum type="romanUcPeriod"/>
+            </a:pPr>
+            <a:r>
+              <a:rPr lang="en" sz="2000">
+                <a:solidFill>
+                  <a:srgbClr val="444444"/>
+                </a:solidFill>
+                <a:highlight>
+                  <a:srgbClr val="FFFFFF"/>
+                </a:highlight>
+                <a:latin typeface="Source Sans Pro"/>
+                <a:ea typeface="Source Sans Pro"/>
+                <a:cs typeface="Source Sans Pro"/>
+                <a:sym typeface="Source Sans Pro"/>
+              </a:rPr>
+              <a:t> Clean code is obvious for other programmers.</a:t>
+            </a:r>
+            <a:endParaRPr sz="2000">
+              <a:solidFill>
+                <a:srgbClr val="444444"/>
+              </a:solidFill>
+              <a:highlight>
+                <a:srgbClr val="FFFFFF"/>
+              </a:highlight>
+              <a:latin typeface="Source Sans Pro"/>
+              <a:ea typeface="Source Sans Pro"/>
+              <a:cs typeface="Source Sans Pro"/>
+              <a:sym typeface="Source Sans Pro"/>
+            </a:endParaRPr>
+          </a:p>
+          <a:p>
+            <a:pPr marL="457200" lvl="0" indent="-355600" algn="l" rtl="0">
+              <a:spcBef>
+                <a:spcPts val="0"/>
+              </a:spcBef>
+              <a:spcAft>
+                <a:spcPts val="0"/>
+              </a:spcAft>
+              <a:buClr>
+                <a:srgbClr val="444444"/>
+              </a:buClr>
+              <a:buSzPts val="2000"/>
+              <a:buFont typeface="Source Sans Pro"/>
+              <a:buAutoNum type="romanUcPeriod"/>
+            </a:pPr>
+            <a:r>
+              <a:rPr lang="en" sz="2000">
+                <a:solidFill>
+                  <a:srgbClr val="444444"/>
+                </a:solidFill>
+                <a:highlight>
+                  <a:srgbClr val="FFFFFF"/>
+                </a:highlight>
+                <a:latin typeface="Source Sans Pro"/>
+                <a:ea typeface="Source Sans Pro"/>
+                <a:cs typeface="Source Sans Pro"/>
+                <a:sym typeface="Source Sans Pro"/>
+              </a:rPr>
+              <a:t> Clean code doesn’t contain duplication.</a:t>
+            </a:r>
+            <a:endParaRPr sz="2000">
+              <a:solidFill>
+                <a:srgbClr val="444444"/>
+              </a:solidFill>
+              <a:highlight>
+                <a:srgbClr val="FFFFFF"/>
+              </a:highlight>
+              <a:latin typeface="Source Sans Pro"/>
+              <a:ea typeface="Source Sans Pro"/>
+              <a:cs typeface="Source Sans Pro"/>
+              <a:sym typeface="Source Sans Pro"/>
+            </a:endParaRPr>
+          </a:p>
+          <a:p>
+            <a:pPr marL="457200" lvl="0" indent="-355600" algn="l" rtl="0">
+              <a:spcBef>
+                <a:spcPts val="0"/>
+              </a:spcBef>
+              <a:spcAft>
+                <a:spcPts val="0"/>
+              </a:spcAft>
+              <a:buClr>
+                <a:srgbClr val="444444"/>
+              </a:buClr>
+              <a:buSzPts val="2000"/>
+              <a:buFont typeface="Source Sans Pro"/>
+              <a:buAutoNum type="romanUcPeriod"/>
+            </a:pPr>
+            <a:r>
+              <a:rPr lang="en" sz="2000">
+                <a:solidFill>
+                  <a:srgbClr val="444444"/>
+                </a:solidFill>
+                <a:highlight>
+                  <a:srgbClr val="FFFFFF"/>
+                </a:highlight>
+                <a:latin typeface="Source Sans Pro"/>
+                <a:ea typeface="Source Sans Pro"/>
+                <a:cs typeface="Source Sans Pro"/>
+                <a:sym typeface="Source Sans Pro"/>
+              </a:rPr>
+              <a:t> Clean code contains a minimal number of classes and other moving parts.</a:t>
+            </a:r>
+            <a:endParaRPr sz="2000">
+              <a:solidFill>
+                <a:srgbClr val="444444"/>
+              </a:solidFill>
+              <a:highlight>
+                <a:srgbClr val="FFFFFF"/>
+              </a:highlight>
+              <a:latin typeface="Source Sans Pro"/>
+              <a:ea typeface="Source Sans Pro"/>
+              <a:cs typeface="Source Sans Pro"/>
+              <a:sym typeface="Source Sans Pro"/>
+            </a:endParaRPr>
+          </a:p>
+          <a:p>
+            <a:pPr marL="457200" lvl="0" indent="-355600" algn="l" rtl="0">
+              <a:spcBef>
+                <a:spcPts val="0"/>
+              </a:spcBef>
+              <a:spcAft>
+                <a:spcPts val="0"/>
+              </a:spcAft>
+              <a:buClr>
+                <a:srgbClr val="444444"/>
+              </a:buClr>
+              <a:buSzPts val="2000"/>
+              <a:buFont typeface="Source Sans Pro"/>
+              <a:buAutoNum type="romanUcPeriod"/>
+            </a:pPr>
+            <a:r>
+              <a:rPr lang="en" sz="2000">
+                <a:solidFill>
+                  <a:srgbClr val="444444"/>
+                </a:solidFill>
+                <a:highlight>
+                  <a:srgbClr val="FFFFFF"/>
+                </a:highlight>
+                <a:latin typeface="Source Sans Pro"/>
+                <a:ea typeface="Source Sans Pro"/>
+                <a:cs typeface="Source Sans Pro"/>
+                <a:sym typeface="Source Sans Pro"/>
+              </a:rPr>
+              <a:t> Clean code passes all tests.</a:t>
+            </a:r>
+            <a:endParaRPr sz="2000">
+              <a:solidFill>
+                <a:srgbClr val="444444"/>
+              </a:solidFill>
+              <a:highlight>
+                <a:srgbClr val="FFFFFF"/>
+              </a:highlight>
+              <a:latin typeface="Source Sans Pro"/>
+              <a:ea typeface="Source Sans Pro"/>
+              <a:cs typeface="Source Sans Pro"/>
+              <a:sym typeface="Source Sans Pro"/>
+            </a:endParaRPr>
+          </a:p>
+          <a:p>
+            <a:pPr marL="457200" lvl="0" indent="-355600" algn="l" rtl="0">
+              <a:spcBef>
+                <a:spcPts val="0"/>
+              </a:spcBef>
+              <a:spcAft>
+                <a:spcPts val="0"/>
+              </a:spcAft>
+              <a:buClr>
+                <a:srgbClr val="444444"/>
+              </a:buClr>
+              <a:buSzPts val="2000"/>
+              <a:buFont typeface="Source Sans Pro"/>
+              <a:buAutoNum type="romanUcPeriod"/>
+            </a:pPr>
+            <a:r>
+              <a:rPr lang="en" sz="2000">
+                <a:solidFill>
+                  <a:srgbClr val="444444"/>
+                </a:solidFill>
+                <a:highlight>
+                  <a:srgbClr val="FFFFFF"/>
+                </a:highlight>
+                <a:latin typeface="Source Sans Pro"/>
+                <a:ea typeface="Source Sans Pro"/>
+                <a:cs typeface="Source Sans Pro"/>
+                <a:sym typeface="Source Sans Pro"/>
+              </a:rPr>
+              <a:t> Clean code is easier and cheaper to maintain!</a:t>
+            </a:r>
+            <a:endParaRPr sz="2000">
+              <a:solidFill>
+                <a:srgbClr val="444444"/>
+              </a:solidFill>
+              <a:highlight>
+                <a:srgbClr val="FFFFFF"/>
+              </a:highlight>
+              <a:latin typeface="Source Sans Pro"/>
+              <a:ea typeface="Source Sans Pro"/>
+              <a:cs typeface="Source Sans Pro"/>
+              <a:sym typeface="Source Sans Pro"/>
+            </a:endParaRPr>
+          </a:p>
+          <a:p>
+            <a:pPr marL="0" lvl="0" indent="0" algn="l" rtl="0">
+              <a:spcBef>
+                <a:spcPts val="200"/>
+              </a:spcBef>
+              <a:spcAft>
+                <a:spcPts val="1600"/>
+              </a:spcAft>
+              <a:buNone/>
+            </a:pPr>
+            <a:endParaRPr sz="2000">
+              <a:solidFill>
+                <a:srgbClr val="444444"/>
+              </a:solidFill>
+              <a:highlight>
+                <a:srgbClr val="FFFFFF"/>
+              </a:highlight>
+            </a:endParaRPr>
+          </a:p>
+        </p:txBody>
+      </p:sp>
+    </p:spTree>
+  </p:cSld>
+  <p:clrMapOvr>
+    <a:masterClrMapping/>
+  </p:clrMapOvr>
+</p:sld>
+</file>
+
+<file path=ppt/slides/slide40.xml><?xml version="1.0" encoding="utf-8"?>
 <p:sld xmlns:a="http://schemas.openxmlformats.org/drawingml/2006/main" xmlns:r="http://schemas.openxmlformats.org/officeDocument/2006/relationships" xmlns:p="http://schemas.openxmlformats.org/presentationml/2006/main">
   <p:cSld>
     <p:spTree>
@@ -21611,7 +24307,7 @@
 </p:sld>
 </file>
 
-<file path=ppt/slides/slide39.xml><?xml version="1.0" encoding="utf-8"?>
+<file path=ppt/slides/slide41.xml><?xml version="1.0" encoding="utf-8"?>
 <p:sld xmlns:a="http://schemas.openxmlformats.org/drawingml/2006/main" xmlns:r="http://schemas.openxmlformats.org/officeDocument/2006/relationships" xmlns:p="http://schemas.openxmlformats.org/presentationml/2006/main">
   <p:cSld>
     <p:spTree>
@@ -21678,368 +24374,7 @@
 </p:sld>
 </file>
 
-<file path=ppt/slides/slide4.xml><?xml version="1.0" encoding="utf-8"?>
-<p:sld xmlns:a="http://schemas.openxmlformats.org/drawingml/2006/main" xmlns:r="http://schemas.openxmlformats.org/officeDocument/2006/relationships" xmlns:p="http://schemas.openxmlformats.org/presentationml/2006/main">
-  <p:cSld>
-    <p:spTree>
-      <p:nvGrpSpPr>
-        <p:cNvPr id="1" name="Shape 74"/>
-        <p:cNvGrpSpPr/>
-        <p:nvPr/>
-      </p:nvGrpSpPr>
-      <p:grpSpPr>
-        <a:xfrm>
-          <a:off x="0" y="0"/>
-          <a:ext cx="0" cy="0"/>
-          <a:chOff x="0" y="0"/>
-          <a:chExt cx="0" cy="0"/>
-        </a:xfrm>
-      </p:grpSpPr>
-      <p:sp>
-        <p:nvSpPr>
-          <p:cNvPr id="75" name="Google Shape;75;p16"/>
-          <p:cNvSpPr txBox="1">
-            <a:spLocks noGrp="1"/>
-          </p:cNvSpPr>
-          <p:nvPr>
-            <p:ph type="title"/>
-          </p:nvPr>
-        </p:nvSpPr>
-        <p:spPr>
-          <a:xfrm>
-            <a:off x="311700" y="445025"/>
-            <a:ext cx="8520600" cy="623400"/>
-          </a:xfrm>
-          <a:prstGeom prst="rect">
-            <a:avLst/>
-          </a:prstGeom>
-        </p:spPr>
-        <p:txBody>
-          <a:bodyPr spcFirstLastPara="1" wrap="square" lIns="91425" tIns="91425" rIns="91425" bIns="91425" anchor="t" anchorCtr="0">
-            <a:noAutofit/>
-          </a:bodyPr>
-          <a:lstStyle/>
-          <a:p>
-            <a:pPr marL="0" lvl="0" indent="0" algn="l" rtl="0">
-              <a:spcBef>
-                <a:spcPts val="0"/>
-              </a:spcBef>
-              <a:spcAft>
-                <a:spcPts val="0"/>
-              </a:spcAft>
-              <a:buNone/>
-            </a:pPr>
-            <a:r>
-              <a:rPr lang="en"/>
-              <a:t>Clean Code</a:t>
-            </a:r>
-            <a:endParaRPr/>
-          </a:p>
-        </p:txBody>
-      </p:sp>
-      <p:sp>
-        <p:nvSpPr>
-          <p:cNvPr id="76" name="Google Shape;76;p16"/>
-          <p:cNvSpPr txBox="1">
-            <a:spLocks noGrp="1"/>
-          </p:cNvSpPr>
-          <p:nvPr>
-            <p:ph type="body" idx="1"/>
-          </p:nvPr>
-        </p:nvSpPr>
-        <p:spPr>
-          <a:xfrm>
-            <a:off x="311700" y="1152475"/>
-            <a:ext cx="8520600" cy="3416400"/>
-          </a:xfrm>
-          <a:prstGeom prst="rect">
-            <a:avLst/>
-          </a:prstGeom>
-        </p:spPr>
-        <p:txBody>
-          <a:bodyPr spcFirstLastPara="1" wrap="square" lIns="91425" tIns="91425" rIns="91425" bIns="91425" anchor="t" anchorCtr="0">
-            <a:noAutofit/>
-          </a:bodyPr>
-          <a:lstStyle/>
-          <a:p>
-            <a:pPr marL="0" lvl="0" indent="0" algn="l" rtl="0">
-              <a:spcBef>
-                <a:spcPts val="0"/>
-              </a:spcBef>
-              <a:spcAft>
-                <a:spcPts val="0"/>
-              </a:spcAft>
-              <a:buNone/>
-            </a:pPr>
-            <a:r>
-              <a:rPr lang="en" sz="2000">
-                <a:solidFill>
-                  <a:srgbClr val="444444"/>
-                </a:solidFill>
-                <a:highlight>
-                  <a:srgbClr val="FFFFFF"/>
-                </a:highlight>
-              </a:rPr>
-              <a:t>The main purpose of refactoring is to fight technical debt. It transforms a mess into clean code and simple design.</a:t>
-            </a:r>
-            <a:endParaRPr sz="2000">
-              <a:solidFill>
-                <a:srgbClr val="444444"/>
-              </a:solidFill>
-              <a:highlight>
-                <a:srgbClr val="FFFFFF"/>
-              </a:highlight>
-              <a:latin typeface="Source Sans Pro"/>
-              <a:ea typeface="Source Sans Pro"/>
-              <a:cs typeface="Source Sans Pro"/>
-              <a:sym typeface="Source Sans Pro"/>
-            </a:endParaRPr>
-          </a:p>
-          <a:p>
-            <a:pPr marL="457200" lvl="0" indent="-355600" algn="l" rtl="0">
-              <a:spcBef>
-                <a:spcPts val="1600"/>
-              </a:spcBef>
-              <a:spcAft>
-                <a:spcPts val="0"/>
-              </a:spcAft>
-              <a:buClr>
-                <a:srgbClr val="444444"/>
-              </a:buClr>
-              <a:buSzPts val="2000"/>
-              <a:buFont typeface="Source Sans Pro"/>
-              <a:buAutoNum type="romanUcPeriod"/>
-            </a:pPr>
-            <a:r>
-              <a:rPr lang="en" sz="2000">
-                <a:solidFill>
-                  <a:srgbClr val="444444"/>
-                </a:solidFill>
-                <a:highlight>
-                  <a:srgbClr val="FFFFFF"/>
-                </a:highlight>
-                <a:latin typeface="Source Sans Pro"/>
-                <a:ea typeface="Source Sans Pro"/>
-                <a:cs typeface="Source Sans Pro"/>
-                <a:sym typeface="Source Sans Pro"/>
-              </a:rPr>
-              <a:t> Clean code is obvious for other programmers.</a:t>
-            </a:r>
-            <a:endParaRPr sz="2000">
-              <a:solidFill>
-                <a:srgbClr val="444444"/>
-              </a:solidFill>
-              <a:highlight>
-                <a:srgbClr val="FFFFFF"/>
-              </a:highlight>
-              <a:latin typeface="Source Sans Pro"/>
-              <a:ea typeface="Source Sans Pro"/>
-              <a:cs typeface="Source Sans Pro"/>
-              <a:sym typeface="Source Sans Pro"/>
-            </a:endParaRPr>
-          </a:p>
-          <a:p>
-            <a:pPr marL="457200" lvl="0" indent="-355600" algn="l" rtl="0">
-              <a:spcBef>
-                <a:spcPts val="0"/>
-              </a:spcBef>
-              <a:spcAft>
-                <a:spcPts val="0"/>
-              </a:spcAft>
-              <a:buClr>
-                <a:srgbClr val="444444"/>
-              </a:buClr>
-              <a:buSzPts val="2000"/>
-              <a:buFont typeface="Source Sans Pro"/>
-              <a:buAutoNum type="romanUcPeriod"/>
-            </a:pPr>
-            <a:r>
-              <a:rPr lang="en" sz="2000">
-                <a:solidFill>
-                  <a:srgbClr val="444444"/>
-                </a:solidFill>
-                <a:highlight>
-                  <a:srgbClr val="FFFFFF"/>
-                </a:highlight>
-                <a:latin typeface="Source Sans Pro"/>
-                <a:ea typeface="Source Sans Pro"/>
-                <a:cs typeface="Source Sans Pro"/>
-                <a:sym typeface="Source Sans Pro"/>
-              </a:rPr>
-              <a:t> Clean code doesn’t contain duplication.</a:t>
-            </a:r>
-            <a:endParaRPr sz="2000">
-              <a:solidFill>
-                <a:srgbClr val="444444"/>
-              </a:solidFill>
-              <a:highlight>
-                <a:srgbClr val="FFFFFF"/>
-              </a:highlight>
-              <a:latin typeface="Source Sans Pro"/>
-              <a:ea typeface="Source Sans Pro"/>
-              <a:cs typeface="Source Sans Pro"/>
-              <a:sym typeface="Source Sans Pro"/>
-            </a:endParaRPr>
-          </a:p>
-          <a:p>
-            <a:pPr marL="457200" lvl="0" indent="-355600" algn="l" rtl="0">
-              <a:spcBef>
-                <a:spcPts val="0"/>
-              </a:spcBef>
-              <a:spcAft>
-                <a:spcPts val="0"/>
-              </a:spcAft>
-              <a:buClr>
-                <a:srgbClr val="444444"/>
-              </a:buClr>
-              <a:buSzPts val="2000"/>
-              <a:buFont typeface="Source Sans Pro"/>
-              <a:buAutoNum type="romanUcPeriod"/>
-            </a:pPr>
-            <a:r>
-              <a:rPr lang="en" sz="2000">
-                <a:solidFill>
-                  <a:srgbClr val="444444"/>
-                </a:solidFill>
-                <a:highlight>
-                  <a:srgbClr val="FFFFFF"/>
-                </a:highlight>
-                <a:latin typeface="Source Sans Pro"/>
-                <a:ea typeface="Source Sans Pro"/>
-                <a:cs typeface="Source Sans Pro"/>
-                <a:sym typeface="Source Sans Pro"/>
-              </a:rPr>
-              <a:t> Clean code contains a minimal number of classes and other moving parts.</a:t>
-            </a:r>
-            <a:endParaRPr sz="2000">
-              <a:solidFill>
-                <a:srgbClr val="444444"/>
-              </a:solidFill>
-              <a:highlight>
-                <a:srgbClr val="FFFFFF"/>
-              </a:highlight>
-              <a:latin typeface="Source Sans Pro"/>
-              <a:ea typeface="Source Sans Pro"/>
-              <a:cs typeface="Source Sans Pro"/>
-              <a:sym typeface="Source Sans Pro"/>
-            </a:endParaRPr>
-          </a:p>
-          <a:p>
-            <a:pPr marL="457200" lvl="0" indent="-355600" algn="l" rtl="0">
-              <a:spcBef>
-                <a:spcPts val="0"/>
-              </a:spcBef>
-              <a:spcAft>
-                <a:spcPts val="0"/>
-              </a:spcAft>
-              <a:buClr>
-                <a:srgbClr val="444444"/>
-              </a:buClr>
-              <a:buSzPts val="2000"/>
-              <a:buFont typeface="Source Sans Pro"/>
-              <a:buAutoNum type="romanUcPeriod"/>
-            </a:pPr>
-            <a:r>
-              <a:rPr lang="en" sz="2000">
-                <a:solidFill>
-                  <a:srgbClr val="444444"/>
-                </a:solidFill>
-                <a:highlight>
-                  <a:srgbClr val="FFFFFF"/>
-                </a:highlight>
-                <a:latin typeface="Source Sans Pro"/>
-                <a:ea typeface="Source Sans Pro"/>
-                <a:cs typeface="Source Sans Pro"/>
-                <a:sym typeface="Source Sans Pro"/>
-              </a:rPr>
-              <a:t> Clean code passes all tests.</a:t>
-            </a:r>
-            <a:endParaRPr sz="2000">
-              <a:solidFill>
-                <a:srgbClr val="444444"/>
-              </a:solidFill>
-              <a:highlight>
-                <a:srgbClr val="FFFFFF"/>
-              </a:highlight>
-              <a:latin typeface="Source Sans Pro"/>
-              <a:ea typeface="Source Sans Pro"/>
-              <a:cs typeface="Source Sans Pro"/>
-              <a:sym typeface="Source Sans Pro"/>
-            </a:endParaRPr>
-          </a:p>
-          <a:p>
-            <a:pPr marL="457200" lvl="0" indent="-355600" algn="l" rtl="0">
-              <a:spcBef>
-                <a:spcPts val="0"/>
-              </a:spcBef>
-              <a:spcAft>
-                <a:spcPts val="0"/>
-              </a:spcAft>
-              <a:buClr>
-                <a:srgbClr val="444444"/>
-              </a:buClr>
-              <a:buSzPts val="2000"/>
-              <a:buFont typeface="Source Sans Pro"/>
-              <a:buAutoNum type="romanUcPeriod"/>
-            </a:pPr>
-            <a:r>
-              <a:rPr lang="en" sz="2000">
-                <a:solidFill>
-                  <a:srgbClr val="444444"/>
-                </a:solidFill>
-                <a:highlight>
-                  <a:srgbClr val="FFFFFF"/>
-                </a:highlight>
-                <a:latin typeface="Source Sans Pro"/>
-                <a:ea typeface="Source Sans Pro"/>
-                <a:cs typeface="Source Sans Pro"/>
-                <a:sym typeface="Source Sans Pro"/>
-              </a:rPr>
-              <a:t> Clean code is easier and cheaper to maintain!</a:t>
-            </a:r>
-            <a:endParaRPr sz="2000">
-              <a:solidFill>
-                <a:srgbClr val="444444"/>
-              </a:solidFill>
-              <a:highlight>
-                <a:srgbClr val="FFFFFF"/>
-              </a:highlight>
-              <a:latin typeface="Source Sans Pro"/>
-              <a:ea typeface="Source Sans Pro"/>
-              <a:cs typeface="Source Sans Pro"/>
-              <a:sym typeface="Source Sans Pro"/>
-            </a:endParaRPr>
-          </a:p>
-          <a:p>
-            <a:pPr marL="0" lvl="0" indent="0" algn="l" rtl="0">
-              <a:spcBef>
-                <a:spcPts val="200"/>
-              </a:spcBef>
-              <a:spcAft>
-                <a:spcPts val="1600"/>
-              </a:spcAft>
-              <a:buNone/>
-            </a:pPr>
-            <a:endParaRPr sz="2000">
-              <a:solidFill>
-                <a:srgbClr val="444444"/>
-              </a:solidFill>
-              <a:highlight>
-                <a:srgbClr val="FFFFFF"/>
-              </a:highlight>
-            </a:endParaRPr>
-          </a:p>
-        </p:txBody>
-      </p:sp>
-    </p:spTree>
-  </p:cSld>
-  <p:clrMapOvr>
-    <a:masterClrMapping/>
-  </p:clrMapOvr>
-</p:sld>
-</file>
-
-<file path=ppt/slides/slide40.xml><?xml version="1.0" encoding="utf-8"?>
+<file path=ppt/slides/slide42.xml><?xml version="1.0" encoding="utf-8"?>
 <p:sld xmlns:a="http://schemas.openxmlformats.org/drawingml/2006/main" xmlns:r="http://schemas.openxmlformats.org/officeDocument/2006/relationships" xmlns:p="http://schemas.openxmlformats.org/presentationml/2006/main">
   <p:cSld>
     <p:spTree>
@@ -22274,7 +24609,7 @@
 </p:sld>
 </file>
 
-<file path=ppt/slides/slide41.xml><?xml version="1.0" encoding="utf-8"?>
+<file path=ppt/slides/slide43.xml><?xml version="1.0" encoding="utf-8"?>
 <p:sld xmlns:a="http://schemas.openxmlformats.org/drawingml/2006/main" xmlns:r="http://schemas.openxmlformats.org/officeDocument/2006/relationships" xmlns:p="http://schemas.openxmlformats.org/presentationml/2006/main">
   <p:cSld>
     <p:spTree>
@@ -22595,7 +24930,7 @@
 </p:sld>
 </file>
 
-<file path=ppt/slides/slide42.xml><?xml version="1.0" encoding="utf-8"?>
+<file path=ppt/slides/slide44.xml><?xml version="1.0" encoding="utf-8"?>
 <p:sld xmlns:a="http://schemas.openxmlformats.org/drawingml/2006/main" xmlns:r="http://schemas.openxmlformats.org/officeDocument/2006/relationships" xmlns:p="http://schemas.openxmlformats.org/presentationml/2006/main">
   <p:cSld>
     <p:spTree>
@@ -23824,7 +26159,7 @@
 </p:sld>
 </file>
 
-<file path=ppt/slides/slide43.xml><?xml version="1.0" encoding="utf-8"?>
+<file path=ppt/slides/slide45.xml><?xml version="1.0" encoding="utf-8"?>
 <p:sld xmlns:a="http://schemas.openxmlformats.org/drawingml/2006/main" xmlns:r="http://schemas.openxmlformats.org/officeDocument/2006/relationships" xmlns:p="http://schemas.openxmlformats.org/presentationml/2006/main">
   <p:cSld>
     <p:spTree>
@@ -25502,7 +27837,7 @@
 </p:sld>
 </file>
 
-<file path=ppt/slides/slide44.xml><?xml version="1.0" encoding="utf-8"?>
+<file path=ppt/slides/slide46.xml><?xml version="1.0" encoding="utf-8"?>
 <p:sld xmlns:a="http://schemas.openxmlformats.org/drawingml/2006/main" xmlns:r="http://schemas.openxmlformats.org/officeDocument/2006/relationships" xmlns:p="http://schemas.openxmlformats.org/presentationml/2006/main">
   <p:cSld>
     <p:spTree>
@@ -27749,7 +30084,7 @@
 </p:sld>
 </file>
 
-<file path=ppt/slides/slide45.xml><?xml version="1.0" encoding="utf-8"?>
+<file path=ppt/slides/slide47.xml><?xml version="1.0" encoding="utf-8"?>
 <p:sld xmlns:a="http://schemas.openxmlformats.org/drawingml/2006/main" xmlns:r="http://schemas.openxmlformats.org/officeDocument/2006/relationships" xmlns:p="http://schemas.openxmlformats.org/presentationml/2006/main">
   <p:cSld>
     <p:spTree>
@@ -28728,7 +31063,7 @@
 </p:sld>
 </file>
 
-<file path=ppt/slides/slide46.xml><?xml version="1.0" encoding="utf-8"?>
+<file path=ppt/slides/slide48.xml><?xml version="1.0" encoding="utf-8"?>
 <p:sld xmlns:a="http://schemas.openxmlformats.org/drawingml/2006/main" xmlns:r="http://schemas.openxmlformats.org/officeDocument/2006/relationships" xmlns:p="http://schemas.openxmlformats.org/presentationml/2006/main">
   <p:cSld>
     <p:spTree>
@@ -28880,7 +31215,7 @@
 </p:sld>
 </file>
 
-<file path=ppt/slides/slide47.xml><?xml version="1.0" encoding="utf-8"?>
+<file path=ppt/slides/slide49.xml><?xml version="1.0" encoding="utf-8"?>
 <p:sld xmlns:a="http://schemas.openxmlformats.org/drawingml/2006/main" xmlns:r="http://schemas.openxmlformats.org/officeDocument/2006/relationships" xmlns:p="http://schemas.openxmlformats.org/presentationml/2006/main">
   <p:cSld>
     <p:spTree>
@@ -29040,7 +31375,7 @@
               </a:spcAft>
               <a:buNone/>
             </a:pPr>
-            <a:endParaRPr sz="2000">
+            <a:endParaRPr sz="2000" dirty="0">
               <a:solidFill>
                 <a:srgbClr val="212121"/>
               </a:solidFill>
@@ -29060,7 +31395,7 @@
               <a:buNone/>
             </a:pPr>
             <a:r>
-              <a:rPr lang="en" sz="2000">
+              <a:rPr lang="en" sz="2000" dirty="0">
                 <a:solidFill>
                   <a:srgbClr val="212121"/>
                 </a:solidFill>
@@ -29071,7 +31406,7 @@
               <a:t>Technical debt, also known as “</a:t>
             </a:r>
             <a:r>
-              <a:rPr lang="en" sz="2000" b="1">
+              <a:rPr lang="en" sz="2000" b="1" dirty="0">
                 <a:solidFill>
                   <a:srgbClr val="212121"/>
                 </a:solidFill>
@@ -29082,7 +31417,7 @@
               <a:t>design debt</a:t>
             </a:r>
             <a:r>
-              <a:rPr lang="en" sz="2000">
+              <a:rPr lang="en" sz="2000" dirty="0">
                 <a:solidFill>
                   <a:srgbClr val="212121"/>
                 </a:solidFill>
@@ -29093,7 +31428,7 @@
               <a:t>,” “</a:t>
             </a:r>
             <a:r>
-              <a:rPr lang="en" sz="2000" b="1">
+              <a:rPr lang="en" sz="2000" b="1" dirty="0">
                 <a:solidFill>
                   <a:srgbClr val="212121"/>
                 </a:solidFill>
@@ -29104,7 +31439,7 @@
               <a:t>code debt</a:t>
             </a:r>
             <a:r>
-              <a:rPr lang="en" sz="2000">
+              <a:rPr lang="en" sz="2000" dirty="0">
                 <a:solidFill>
                   <a:srgbClr val="212121"/>
                 </a:solidFill>
@@ -29115,7 +31450,7 @@
               <a:t>,” or “</a:t>
             </a:r>
             <a:r>
-              <a:rPr lang="en" sz="2000" b="1">
+              <a:rPr lang="en" sz="2000" b="1" dirty="0">
                 <a:solidFill>
                   <a:srgbClr val="212121"/>
                 </a:solidFill>
@@ -29126,7 +31461,7 @@
               <a:t>tech debt</a:t>
             </a:r>
             <a:r>
-              <a:rPr lang="en" sz="2000">
+              <a:rPr lang="en" sz="2000" dirty="0">
                 <a:solidFill>
                   <a:srgbClr val="212121"/>
                 </a:solidFill>
@@ -29137,7 +31472,7 @@
               <a:t>,” is defined as the result of a </a:t>
             </a:r>
             <a:r>
-              <a:rPr lang="en" sz="2000" b="1">
+              <a:rPr lang="en" sz="2000" b="1" dirty="0">
                 <a:solidFill>
                   <a:srgbClr val="212121"/>
                 </a:solidFill>
@@ -29148,7 +31483,7 @@
               <a:t>development team choosing a faster</a:t>
             </a:r>
             <a:r>
-              <a:rPr lang="en" sz="2000">
+              <a:rPr lang="en" sz="2000" dirty="0">
                 <a:solidFill>
                   <a:srgbClr val="212121"/>
                 </a:solidFill>
@@ -29159,7 +31494,7 @@
               <a:t> but </a:t>
             </a:r>
             <a:r>
-              <a:rPr lang="en" sz="2000" b="1">
+              <a:rPr lang="en" sz="2000" b="1" dirty="0">
                 <a:solidFill>
                   <a:srgbClr val="212121"/>
                 </a:solidFill>
@@ -29170,7 +31505,7 @@
               <a:t>less comprehensive solution</a:t>
             </a:r>
             <a:r>
-              <a:rPr lang="en" sz="2000">
+              <a:rPr lang="en" sz="2000" dirty="0">
                 <a:solidFill>
                   <a:srgbClr val="212121"/>
                 </a:solidFill>
@@ -29181,7 +31516,7 @@
               <a:t> to a problem over a </a:t>
             </a:r>
             <a:r>
-              <a:rPr lang="en" sz="2000" b="1">
+              <a:rPr lang="en" sz="2000" b="1" dirty="0">
                 <a:solidFill>
                   <a:srgbClr val="212121"/>
                 </a:solidFill>
@@ -29192,7 +31527,7 @@
               <a:t>slower but more comprehensive</a:t>
             </a:r>
             <a:r>
-              <a:rPr lang="en" sz="2000">
+              <a:rPr lang="en" sz="2000" dirty="0">
                 <a:solidFill>
                   <a:srgbClr val="212121"/>
                 </a:solidFill>
@@ -29202,7 +31537,7 @@
               </a:rPr>
               <a:t> solution.</a:t>
             </a:r>
-            <a:endParaRPr sz="2000"/>
+            <a:endParaRPr sz="2000" dirty="0"/>
           </a:p>
         </p:txBody>
       </p:sp>
@@ -29285,8 +31620,8 @@
         </p:nvSpPr>
         <p:spPr>
           <a:xfrm>
-            <a:off x="311700" y="1152475"/>
-            <a:ext cx="8520600" cy="3416400"/>
+            <a:off x="311700" y="1152474"/>
+            <a:ext cx="8520600" cy="3800525"/>
           </a:xfrm>
           <a:prstGeom prst="rect">
             <a:avLst/>
@@ -29312,7 +31647,7 @@
               <a:buChar char="●"/>
             </a:pPr>
             <a:r>
-              <a:rPr lang="en" sz="2000">
+              <a:rPr lang="en" sz="2000" dirty="0">
                 <a:solidFill>
                   <a:schemeClr val="dk2"/>
                 </a:solidFill>
@@ -29322,7 +31657,7 @@
               </a:rPr>
               <a:t> Business pressure</a:t>
             </a:r>
-            <a:endParaRPr sz="2000">
+            <a:endParaRPr sz="2000" dirty="0">
               <a:solidFill>
                 <a:schemeClr val="dk2"/>
               </a:solidFill>
@@ -29346,7 +31681,7 @@
               <a:buChar char="●"/>
             </a:pPr>
             <a:r>
-              <a:rPr lang="en" sz="2000">
+              <a:rPr lang="en" sz="2000" dirty="0">
                 <a:solidFill>
                   <a:schemeClr val="dk2"/>
                 </a:solidFill>
@@ -29356,7 +31691,7 @@
               </a:rPr>
               <a:t> Lack of understanding of the consequences of technical debt</a:t>
             </a:r>
-            <a:endParaRPr sz="2000">
+            <a:endParaRPr sz="2000" dirty="0">
               <a:solidFill>
                 <a:schemeClr val="dk2"/>
               </a:solidFill>
@@ -29380,7 +31715,7 @@
               <a:buChar char="●"/>
             </a:pPr>
             <a:r>
-              <a:rPr lang="en" sz="2000">
+              <a:rPr lang="en" sz="2000" dirty="0">
                 <a:solidFill>
                   <a:schemeClr val="dk2"/>
                 </a:solidFill>
@@ -29390,7 +31725,7 @@
               </a:rPr>
               <a:t> Failing to combat the strict coherence of components</a:t>
             </a:r>
-            <a:endParaRPr sz="2000">
+            <a:endParaRPr sz="2000" dirty="0">
               <a:solidFill>
                 <a:schemeClr val="dk2"/>
               </a:solidFill>
@@ -29414,7 +31749,7 @@
               <a:buChar char="●"/>
             </a:pPr>
             <a:r>
-              <a:rPr lang="en" sz="2000">
+              <a:rPr lang="en" sz="2000" dirty="0">
                 <a:solidFill>
                   <a:schemeClr val="dk2"/>
                 </a:solidFill>
@@ -29424,7 +31759,7 @@
               </a:rPr>
               <a:t> Lack of tests</a:t>
             </a:r>
-            <a:endParaRPr sz="2000">
+            <a:endParaRPr sz="2000" dirty="0">
               <a:solidFill>
                 <a:schemeClr val="dk2"/>
               </a:solidFill>
@@ -29448,7 +31783,7 @@
               <a:buChar char="●"/>
             </a:pPr>
             <a:r>
-              <a:rPr lang="en" sz="2000">
+              <a:rPr lang="en" sz="2000" dirty="0">
                 <a:solidFill>
                   <a:schemeClr val="dk2"/>
                 </a:solidFill>
@@ -29458,7 +31793,7 @@
               </a:rPr>
               <a:t> Lack of documentation</a:t>
             </a:r>
-            <a:endParaRPr sz="2000">
+            <a:endParaRPr sz="2000" dirty="0">
               <a:solidFill>
                 <a:schemeClr val="dk2"/>
               </a:solidFill>
@@ -29482,7 +31817,7 @@
               <a:buChar char="●"/>
             </a:pPr>
             <a:r>
-              <a:rPr lang="en" sz="2000">
+              <a:rPr lang="en" sz="2000" dirty="0">
                 <a:solidFill>
                   <a:schemeClr val="dk2"/>
                 </a:solidFill>
@@ -29492,7 +31827,7 @@
               </a:rPr>
               <a:t> Lack of interaction between team members</a:t>
             </a:r>
-            <a:endParaRPr sz="2000">
+            <a:endParaRPr sz="2000" dirty="0">
               <a:solidFill>
                 <a:schemeClr val="dk2"/>
               </a:solidFill>
@@ -29516,7 +31851,7 @@
               <a:buChar char="●"/>
             </a:pPr>
             <a:r>
-              <a:rPr lang="en" sz="2000">
+              <a:rPr lang="en" sz="2000" dirty="0">
                 <a:solidFill>
                   <a:schemeClr val="dk2"/>
                 </a:solidFill>
@@ -29526,7 +31861,7 @@
               </a:rPr>
               <a:t> Long-term simultaneous development in several branches</a:t>
             </a:r>
-            <a:endParaRPr sz="2000">
+            <a:endParaRPr sz="2000" dirty="0">
               <a:solidFill>
                 <a:schemeClr val="dk2"/>
               </a:solidFill>
@@ -29550,7 +31885,7 @@
               <a:buChar char="●"/>
             </a:pPr>
             <a:r>
-              <a:rPr lang="en" sz="2000">
+              <a:rPr lang="en" sz="2000" dirty="0">
                 <a:solidFill>
                   <a:schemeClr val="dk2"/>
                 </a:solidFill>
@@ -29560,7 +31895,7 @@
               </a:rPr>
               <a:t> Delayed refactoring</a:t>
             </a:r>
-            <a:endParaRPr sz="2000">
+            <a:endParaRPr sz="2000" dirty="0">
               <a:solidFill>
                 <a:schemeClr val="dk2"/>
               </a:solidFill>
@@ -29584,7 +31919,7 @@
               <a:buChar char="●"/>
             </a:pPr>
             <a:r>
-              <a:rPr lang="en" sz="2000">
+              <a:rPr lang="en" sz="2000" dirty="0">
                 <a:solidFill>
                   <a:schemeClr val="dk2"/>
                 </a:solidFill>
@@ -29594,7 +31929,7 @@
               </a:rPr>
               <a:t> Lack of compliance monitoring</a:t>
             </a:r>
-            <a:endParaRPr sz="2000">
+            <a:endParaRPr sz="2000" dirty="0">
               <a:solidFill>
                 <a:schemeClr val="dk2"/>
               </a:solidFill>
@@ -29618,7 +31953,7 @@
               <a:buChar char="●"/>
             </a:pPr>
             <a:r>
-              <a:rPr lang="en" sz="2000">
+              <a:rPr lang="en" sz="2000" dirty="0">
                 <a:solidFill>
                   <a:schemeClr val="dk2"/>
                 </a:solidFill>
@@ -29628,7 +31963,7 @@
               </a:rPr>
               <a:t> Incompetence</a:t>
             </a:r>
-            <a:endParaRPr sz="2000">
+            <a:endParaRPr sz="2000" dirty="0">
               <a:solidFill>
                 <a:schemeClr val="dk2"/>
               </a:solidFill>
@@ -29738,7 +32073,7 @@
               <a:buNone/>
             </a:pPr>
             <a:r>
-              <a:rPr lang="en" sz="1100" b="1">
+              <a:rPr lang="en" sz="1100" b="1" dirty="0">
                 <a:solidFill>
                   <a:srgbClr val="444444"/>
                 </a:solidFill>
@@ -29752,7 +32087,7 @@
               </a:rPr>
               <a:t>Rule of Three</a:t>
             </a:r>
-            <a:endParaRPr sz="1100" b="1">
+            <a:endParaRPr sz="1100" b="1" dirty="0">
               <a:solidFill>
                 <a:srgbClr val="444444"/>
               </a:solidFill>
@@ -29781,7 +32116,7 @@
               <a:buAutoNum type="arabicPeriod"/>
             </a:pPr>
             <a:r>
-              <a:rPr lang="en" sz="1200">
+              <a:rPr lang="en" sz="1200" dirty="0">
                 <a:solidFill>
                   <a:srgbClr val="444444"/>
                 </a:solidFill>
@@ -29795,7 +32130,7 @@
               </a:rPr>
               <a:t>When you’re doing something for the first time, just get it done.</a:t>
             </a:r>
-            <a:endParaRPr sz="1200">
+            <a:endParaRPr sz="1200" dirty="0">
               <a:solidFill>
                 <a:srgbClr val="444444"/>
               </a:solidFill>
@@ -29824,7 +32159,7 @@
               <a:buAutoNum type="arabicPeriod"/>
             </a:pPr>
             <a:r>
-              <a:rPr lang="en" sz="1200">
+              <a:rPr lang="en" sz="1200" dirty="0">
                 <a:solidFill>
                   <a:srgbClr val="444444"/>
                 </a:solidFill>
@@ -29838,7 +32173,7 @@
               </a:rPr>
               <a:t>When you’re doing something similar for the second time, cringe at having to repeat but do the same thing anyway.</a:t>
             </a:r>
-            <a:endParaRPr sz="1200">
+            <a:endParaRPr sz="1200" dirty="0">
               <a:solidFill>
                 <a:srgbClr val="444444"/>
               </a:solidFill>
@@ -29867,7 +32202,7 @@
               <a:buAutoNum type="arabicPeriod"/>
             </a:pPr>
             <a:r>
-              <a:rPr lang="en" sz="1200">
+              <a:rPr lang="en" sz="1200" dirty="0">
                 <a:solidFill>
                   <a:srgbClr val="444444"/>
                 </a:solidFill>
@@ -29881,7 +32216,7 @@
               </a:rPr>
               <a:t>When you’re doing something for the third time, start refactoring.</a:t>
             </a:r>
-            <a:endParaRPr sz="1200">
+            <a:endParaRPr sz="1200" dirty="0">
               <a:solidFill>
                 <a:srgbClr val="444444"/>
               </a:solidFill>
@@ -29904,7 +32239,7 @@
               </a:spcAft>
               <a:buNone/>
             </a:pPr>
-            <a:endParaRPr/>
+            <a:endParaRPr dirty="0"/>
           </a:p>
         </p:txBody>
       </p:sp>
@@ -30015,7 +32350,7 @@
               <a:buNone/>
             </a:pPr>
             <a:r>
-              <a:rPr lang="en" sz="2000" b="1">
+              <a:rPr lang="en" sz="2000" b="1" dirty="0">
                 <a:solidFill>
                   <a:srgbClr val="444444"/>
                 </a:solidFill>
@@ -30025,7 +32360,7 @@
               </a:rPr>
               <a:t>When adding a feature</a:t>
             </a:r>
-            <a:endParaRPr sz="2000" b="1">
+            <a:endParaRPr sz="2000" b="1" dirty="0">
               <a:solidFill>
                 <a:srgbClr val="444444"/>
               </a:solidFill>
@@ -30050,7 +32385,7 @@
               <a:buChar char="●"/>
             </a:pPr>
             <a:r>
-              <a:rPr lang="en" sz="2000">
+              <a:rPr lang="en" sz="2000" dirty="0">
                 <a:solidFill>
                   <a:srgbClr val="444444"/>
                 </a:solidFill>
@@ -30060,7 +32395,7 @@
               </a:rPr>
               <a:t>Refactoring helps you understand other people’s code. If you have to deal with someone else’s dirty code, try to refactor it first. Clean code is much easier to grasp. You will improve it not only for yourself but also for those who use it after you.</a:t>
             </a:r>
-            <a:endParaRPr sz="2000">
+            <a:endParaRPr sz="2000" dirty="0">
               <a:solidFill>
                 <a:srgbClr val="444444"/>
               </a:solidFill>
@@ -30085,7 +32420,7 @@
               <a:buChar char="●"/>
             </a:pPr>
             <a:r>
-              <a:rPr lang="en" sz="2000">
+              <a:rPr lang="en" sz="2000" dirty="0">
                 <a:solidFill>
                   <a:srgbClr val="444444"/>
                 </a:solidFill>
@@ -30095,7 +32430,7 @@
               </a:rPr>
               <a:t>Refactoring makes it easier to add new features. It’s much easier to make changes in clean code.</a:t>
             </a:r>
-            <a:endParaRPr sz="2000">
+            <a:endParaRPr sz="2000" dirty="0">
               <a:solidFill>
                 <a:srgbClr val="444444"/>
               </a:solidFill>

</xml_diff>